<commit_message>
session code and slides
</commit_message>
<xml_diff>
--- a/CognitionEmotion7_RTutorial4/R_tutorial_4_slides.pptx
+++ b/CognitionEmotion7_RTutorial4/R_tutorial_4_slides.pptx
@@ -4,6 +4,9 @@
   <p:sldMasterIdLst>
     <p:sldMasterId id="2147483648" r:id="rId1"/>
   </p:sldMasterIdLst>
+  <p:notesMasterIdLst>
+    <p:notesMasterId r:id="rId29"/>
+  </p:notesMasterIdLst>
   <p:sldIdLst>
     <p:sldId id="256" r:id="rId2"/>
     <p:sldId id="257" r:id="rId3"/>
@@ -25,15 +28,13 @@
     <p:sldId id="273" r:id="rId19"/>
     <p:sldId id="274" r:id="rId20"/>
     <p:sldId id="275" r:id="rId21"/>
-    <p:sldId id="276" r:id="rId22"/>
-    <p:sldId id="277" r:id="rId23"/>
-    <p:sldId id="278" r:id="rId24"/>
-    <p:sldId id="279" r:id="rId25"/>
-    <p:sldId id="280" r:id="rId26"/>
-    <p:sldId id="281" r:id="rId27"/>
-    <p:sldId id="284" r:id="rId28"/>
-    <p:sldId id="282" r:id="rId29"/>
-    <p:sldId id="283" r:id="rId30"/>
+    <p:sldId id="278" r:id="rId22"/>
+    <p:sldId id="279" r:id="rId23"/>
+    <p:sldId id="280" r:id="rId24"/>
+    <p:sldId id="281" r:id="rId25"/>
+    <p:sldId id="284" r:id="rId26"/>
+    <p:sldId id="282" r:id="rId27"/>
+    <p:sldId id="283" r:id="rId28"/>
   </p:sldIdLst>
   <p:sldSz cx="12192000" cy="6858000"/>
   <p:notesSz cx="6858000" cy="9144000"/>
@@ -143,7 +144,7 @@
 <file path=ppt/revisionInfo.xml><?xml version="1.0" encoding="utf-8"?>
 <p1510:revInfo xmlns:a="http://schemas.openxmlformats.org/drawingml/2006/main" xmlns:r="http://schemas.openxmlformats.org/officeDocument/2006/relationships" xmlns:p1510="http://schemas.microsoft.com/office/powerpoint/2015/10/main">
   <p1510:revLst>
-    <p1510:client id="{990333E0-B591-B849-810C-6BA3AAB626C2}" v="79" dt="2020-05-28T09:06:49.947"/>
+    <p1510:client id="{990333E0-B591-B849-810C-6BA3AAB626C2}" v="80" dt="2020-05-28T15:34:20.594"/>
   </p1510:revLst>
 </p1510:revInfo>
 </file>
@@ -153,7 +154,7 @@
   <pc:docChgLst>
     <pc:chgData name="Aaron McInnes" userId="171bdf0d-4e2d-4ff0-8f57-fda72b0a8d25" providerId="ADAL" clId="{990333E0-B591-B849-810C-6BA3AAB626C2}"/>
     <pc:docChg chg="undo custSel addSld delSld modSld">
-      <pc:chgData name="Aaron McInnes" userId="171bdf0d-4e2d-4ff0-8f57-fda72b0a8d25" providerId="ADAL" clId="{990333E0-B591-B849-810C-6BA3AAB626C2}" dt="2020-05-28T09:07:13.326" v="5490" actId="14100"/>
+      <pc:chgData name="Aaron McInnes" userId="171bdf0d-4e2d-4ff0-8f57-fda72b0a8d25" providerId="ADAL" clId="{990333E0-B591-B849-810C-6BA3AAB626C2}" dt="2020-05-28T15:35:21.675" v="5566" actId="20577"/>
       <pc:docMkLst>
         <pc:docMk/>
       </pc:docMkLst>
@@ -248,7 +249,7 @@
         </pc:sldMkLst>
       </pc:sldChg>
       <pc:sldChg chg="modSp add">
-        <pc:chgData name="Aaron McInnes" userId="171bdf0d-4e2d-4ff0-8f57-fda72b0a8d25" providerId="ADAL" clId="{990333E0-B591-B849-810C-6BA3AAB626C2}" dt="2020-05-26T05:04:39.759" v="1021" actId="20577"/>
+        <pc:chgData name="Aaron McInnes" userId="171bdf0d-4e2d-4ff0-8f57-fda72b0a8d25" providerId="ADAL" clId="{990333E0-B591-B849-810C-6BA3AAB626C2}" dt="2020-05-28T14:45:15.597" v="5494" actId="20577"/>
         <pc:sldMkLst>
           <pc:docMk/>
           <pc:sldMk cId="2378185953" sldId="261"/>
@@ -262,7 +263,7 @@
           </ac:spMkLst>
         </pc:spChg>
         <pc:spChg chg="mod">
-          <ac:chgData name="Aaron McInnes" userId="171bdf0d-4e2d-4ff0-8f57-fda72b0a8d25" providerId="ADAL" clId="{990333E0-B591-B849-810C-6BA3AAB626C2}" dt="2020-05-26T05:04:39.759" v="1021" actId="20577"/>
+          <ac:chgData name="Aaron McInnes" userId="171bdf0d-4e2d-4ff0-8f57-fda72b0a8d25" providerId="ADAL" clId="{990333E0-B591-B849-810C-6BA3AAB626C2}" dt="2020-05-28T14:45:15.597" v="5494" actId="20577"/>
           <ac:spMkLst>
             <pc:docMk/>
             <pc:sldMk cId="2378185953" sldId="261"/>
@@ -673,7 +674,7 @@
         </pc:spChg>
       </pc:sldChg>
       <pc:sldChg chg="modSp add">
-        <pc:chgData name="Aaron McInnes" userId="171bdf0d-4e2d-4ff0-8f57-fda72b0a8d25" providerId="ADAL" clId="{990333E0-B591-B849-810C-6BA3AAB626C2}" dt="2020-05-28T06:30:50.066" v="3017" actId="113"/>
+        <pc:chgData name="Aaron McInnes" userId="171bdf0d-4e2d-4ff0-8f57-fda72b0a8d25" providerId="ADAL" clId="{990333E0-B591-B849-810C-6BA3AAB626C2}" dt="2020-05-28T15:11:25.545" v="5498" actId="313"/>
         <pc:sldMkLst>
           <pc:docMk/>
           <pc:sldMk cId="477839598" sldId="273"/>
@@ -687,7 +688,7 @@
           </ac:spMkLst>
         </pc:spChg>
         <pc:spChg chg="mod">
-          <ac:chgData name="Aaron McInnes" userId="171bdf0d-4e2d-4ff0-8f57-fda72b0a8d25" providerId="ADAL" clId="{990333E0-B591-B849-810C-6BA3AAB626C2}" dt="2020-05-28T06:30:50.066" v="3017" actId="113"/>
+          <ac:chgData name="Aaron McInnes" userId="171bdf0d-4e2d-4ff0-8f57-fda72b0a8d25" providerId="ADAL" clId="{990333E0-B591-B849-810C-6BA3AAB626C2}" dt="2020-05-28T15:11:25.545" v="5498" actId="313"/>
           <ac:spMkLst>
             <pc:docMk/>
             <pc:sldMk cId="477839598" sldId="273"/>
@@ -740,8 +741,8 @@
           </ac:spMkLst>
         </pc:spChg>
       </pc:sldChg>
-      <pc:sldChg chg="modSp add">
-        <pc:chgData name="Aaron McInnes" userId="171bdf0d-4e2d-4ff0-8f57-fda72b0a8d25" providerId="ADAL" clId="{990333E0-B591-B849-810C-6BA3AAB626C2}" dt="2020-05-28T06:51:38.522" v="3345" actId="113"/>
+      <pc:sldChg chg="modSp add del">
+        <pc:chgData name="Aaron McInnes" userId="171bdf0d-4e2d-4ff0-8f57-fda72b0a8d25" providerId="ADAL" clId="{990333E0-B591-B849-810C-6BA3AAB626C2}" dt="2020-05-28T15:14:58.637" v="5499" actId="2696"/>
         <pc:sldMkLst>
           <pc:docMk/>
           <pc:sldMk cId="1489586080" sldId="276"/>
@@ -763,8 +764,8 @@
           </ac:spMkLst>
         </pc:spChg>
       </pc:sldChg>
-      <pc:sldChg chg="modSp add">
-        <pc:chgData name="Aaron McInnes" userId="171bdf0d-4e2d-4ff0-8f57-fda72b0a8d25" providerId="ADAL" clId="{990333E0-B591-B849-810C-6BA3AAB626C2}" dt="2020-05-28T07:44:47.736" v="3631" actId="20577"/>
+      <pc:sldChg chg="modSp add del">
+        <pc:chgData name="Aaron McInnes" userId="171bdf0d-4e2d-4ff0-8f57-fda72b0a8d25" providerId="ADAL" clId="{990333E0-B591-B849-810C-6BA3AAB626C2}" dt="2020-05-28T15:14:58.648" v="5500" actId="2696"/>
         <pc:sldMkLst>
           <pc:docMk/>
           <pc:sldMk cId="2306554525" sldId="277"/>
@@ -817,13 +818,13 @@
         </pc:spChg>
       </pc:sldChg>
       <pc:sldChg chg="modSp add">
-        <pc:chgData name="Aaron McInnes" userId="171bdf0d-4e2d-4ff0-8f57-fda72b0a8d25" providerId="ADAL" clId="{990333E0-B591-B849-810C-6BA3AAB626C2}" dt="2020-05-28T07:39:32.416" v="3616" actId="207"/>
+        <pc:chgData name="Aaron McInnes" userId="171bdf0d-4e2d-4ff0-8f57-fda72b0a8d25" providerId="ADAL" clId="{990333E0-B591-B849-810C-6BA3AAB626C2}" dt="2020-05-28T15:34:50.029" v="5565" actId="313"/>
         <pc:sldMkLst>
           <pc:docMk/>
           <pc:sldMk cId="2528711242" sldId="280"/>
         </pc:sldMkLst>
         <pc:spChg chg="mod">
-          <ac:chgData name="Aaron McInnes" userId="171bdf0d-4e2d-4ff0-8f57-fda72b0a8d25" providerId="ADAL" clId="{990333E0-B591-B849-810C-6BA3AAB626C2}" dt="2020-05-28T07:39:32.416" v="3616" actId="207"/>
+          <ac:chgData name="Aaron McInnes" userId="171bdf0d-4e2d-4ff0-8f57-fda72b0a8d25" providerId="ADAL" clId="{990333E0-B591-B849-810C-6BA3AAB626C2}" dt="2020-05-28T15:34:50.029" v="5565" actId="313"/>
           <ac:spMkLst>
             <pc:docMk/>
             <pc:sldMk cId="2528711242" sldId="280"/>
@@ -832,7 +833,7 @@
         </pc:spChg>
       </pc:sldChg>
       <pc:sldChg chg="modSp add">
-        <pc:chgData name="Aaron McInnes" userId="171bdf0d-4e2d-4ff0-8f57-fda72b0a8d25" providerId="ADAL" clId="{990333E0-B591-B849-810C-6BA3AAB626C2}" dt="2020-05-28T08:17:21.510" v="4154" actId="20577"/>
+        <pc:chgData name="Aaron McInnes" userId="171bdf0d-4e2d-4ff0-8f57-fda72b0a8d25" providerId="ADAL" clId="{990333E0-B591-B849-810C-6BA3AAB626C2}" dt="2020-05-28T15:35:21.675" v="5566" actId="20577"/>
         <pc:sldMkLst>
           <pc:docMk/>
           <pc:sldMk cId="3449182904" sldId="281"/>
@@ -846,7 +847,7 @@
           </ac:spMkLst>
         </pc:spChg>
         <pc:spChg chg="mod">
-          <ac:chgData name="Aaron McInnes" userId="171bdf0d-4e2d-4ff0-8f57-fda72b0a8d25" providerId="ADAL" clId="{990333E0-B591-B849-810C-6BA3AAB626C2}" dt="2020-05-28T08:17:21.510" v="4154" actId="20577"/>
+          <ac:chgData name="Aaron McInnes" userId="171bdf0d-4e2d-4ff0-8f57-fda72b0a8d25" providerId="ADAL" clId="{990333E0-B591-B849-810C-6BA3AAB626C2}" dt="2020-05-28T15:35:21.675" v="5566" actId="20577"/>
           <ac:spMkLst>
             <pc:docMk/>
             <pc:sldMk cId="3449182904" sldId="281"/>
@@ -1585,6 +1586,440 @@
 </pc:chgInfo>
 </file>
 
+<file path=ppt/notesMasters/notesMaster1.xml><?xml version="1.0" encoding="utf-8"?>
+<p:notesMaster xmlns:a="http://schemas.openxmlformats.org/drawingml/2006/main" xmlns:r="http://schemas.openxmlformats.org/officeDocument/2006/relationships" xmlns:p="http://schemas.openxmlformats.org/presentationml/2006/main">
+  <p:cSld>
+    <p:bg>
+      <p:bgRef idx="1001">
+        <a:schemeClr val="bg1"/>
+      </p:bgRef>
+    </p:bg>
+    <p:spTree>
+      <p:nvGrpSpPr>
+        <p:cNvPr id="1" name=""/>
+        <p:cNvGrpSpPr/>
+        <p:nvPr/>
+      </p:nvGrpSpPr>
+      <p:grpSpPr>
+        <a:xfrm>
+          <a:off x="0" y="0"/>
+          <a:ext cx="0" cy="0"/>
+          <a:chOff x="0" y="0"/>
+          <a:chExt cx="0" cy="0"/>
+        </a:xfrm>
+      </p:grpSpPr>
+      <p:sp>
+        <p:nvSpPr>
+          <p:cNvPr id="2" name="Header Placeholder 1"/>
+          <p:cNvSpPr>
+            <a:spLocks noGrp="1"/>
+          </p:cNvSpPr>
+          <p:nvPr>
+            <p:ph type="hdr" sz="quarter"/>
+          </p:nvPr>
+        </p:nvSpPr>
+        <p:spPr>
+          <a:xfrm>
+            <a:off x="0" y="0"/>
+            <a:ext cx="2971800" cy="458788"/>
+          </a:xfrm>
+          <a:prstGeom prst="rect">
+            <a:avLst/>
+          </a:prstGeom>
+        </p:spPr>
+        <p:txBody>
+          <a:bodyPr vert="horz" lIns="91440" tIns="45720" rIns="91440" bIns="45720" rtlCol="0"/>
+          <a:lstStyle>
+            <a:lvl1pPr algn="l">
+              <a:defRPr sz="1200"/>
+            </a:lvl1pPr>
+          </a:lstStyle>
+          <a:p>
+            <a:endParaRPr lang="en-AU"/>
+          </a:p>
+        </p:txBody>
+      </p:sp>
+      <p:sp>
+        <p:nvSpPr>
+          <p:cNvPr id="3" name="Date Placeholder 2"/>
+          <p:cNvSpPr>
+            <a:spLocks noGrp="1"/>
+          </p:cNvSpPr>
+          <p:nvPr>
+            <p:ph type="dt" idx="1"/>
+          </p:nvPr>
+        </p:nvSpPr>
+        <p:spPr>
+          <a:xfrm>
+            <a:off x="3884613" y="0"/>
+            <a:ext cx="2971800" cy="458788"/>
+          </a:xfrm>
+          <a:prstGeom prst="rect">
+            <a:avLst/>
+          </a:prstGeom>
+        </p:spPr>
+        <p:txBody>
+          <a:bodyPr vert="horz" lIns="91440" tIns="45720" rIns="91440" bIns="45720" rtlCol="0"/>
+          <a:lstStyle>
+            <a:lvl1pPr algn="r">
+              <a:defRPr sz="1200"/>
+            </a:lvl1pPr>
+          </a:lstStyle>
+          <a:p>
+            <a:fld id="{A38B20A2-1306-8542-A7AC-3B89E1D8558C}" type="datetimeFigureOut">
+              <a:rPr lang="en-AU" smtClean="0"/>
+              <a:t>28/5/20</a:t>
+            </a:fld>
+            <a:endParaRPr lang="en-AU"/>
+          </a:p>
+        </p:txBody>
+      </p:sp>
+      <p:sp>
+        <p:nvSpPr>
+          <p:cNvPr id="4" name="Slide Image Placeholder 3"/>
+          <p:cNvSpPr>
+            <a:spLocks noGrp="1" noRot="1" noChangeAspect="1"/>
+          </p:cNvSpPr>
+          <p:nvPr>
+            <p:ph type="sldImg" idx="2"/>
+          </p:nvPr>
+        </p:nvSpPr>
+        <p:spPr>
+          <a:xfrm>
+            <a:off x="685800" y="1143000"/>
+            <a:ext cx="5486400" cy="3086100"/>
+          </a:xfrm>
+          <a:prstGeom prst="rect">
+            <a:avLst/>
+          </a:prstGeom>
+          <a:noFill/>
+          <a:ln w="12700">
+            <a:solidFill>
+              <a:prstClr val="black"/>
+            </a:solidFill>
+          </a:ln>
+        </p:spPr>
+        <p:txBody>
+          <a:bodyPr vert="horz" lIns="91440" tIns="45720" rIns="91440" bIns="45720" rtlCol="0" anchor="ctr"/>
+          <a:lstStyle/>
+          <a:p>
+            <a:endParaRPr lang="en-AU"/>
+          </a:p>
+        </p:txBody>
+      </p:sp>
+      <p:sp>
+        <p:nvSpPr>
+          <p:cNvPr id="5" name="Notes Placeholder 4"/>
+          <p:cNvSpPr>
+            <a:spLocks noGrp="1"/>
+          </p:cNvSpPr>
+          <p:nvPr>
+            <p:ph type="body" sz="quarter" idx="3"/>
+          </p:nvPr>
+        </p:nvSpPr>
+        <p:spPr>
+          <a:xfrm>
+            <a:off x="685800" y="4400550"/>
+            <a:ext cx="5486400" cy="3600450"/>
+          </a:xfrm>
+          <a:prstGeom prst="rect">
+            <a:avLst/>
+          </a:prstGeom>
+        </p:spPr>
+        <p:txBody>
+          <a:bodyPr vert="horz" lIns="91440" tIns="45720" rIns="91440" bIns="45720" rtlCol="0"/>
+          <a:lstStyle/>
+          <a:p>
+            <a:pPr lvl="0"/>
+            <a:r>
+              <a:rPr lang="en-GB"/>
+              <a:t>Click to edit Master text styles</a:t>
+            </a:r>
+          </a:p>
+          <a:p>
+            <a:pPr lvl="1"/>
+            <a:r>
+              <a:rPr lang="en-GB"/>
+              <a:t>Second level</a:t>
+            </a:r>
+          </a:p>
+          <a:p>
+            <a:pPr lvl="2"/>
+            <a:r>
+              <a:rPr lang="en-GB"/>
+              <a:t>Third level</a:t>
+            </a:r>
+          </a:p>
+          <a:p>
+            <a:pPr lvl="3"/>
+            <a:r>
+              <a:rPr lang="en-GB"/>
+              <a:t>Fourth level</a:t>
+            </a:r>
+          </a:p>
+          <a:p>
+            <a:pPr lvl="4"/>
+            <a:r>
+              <a:rPr lang="en-GB"/>
+              <a:t>Fifth level</a:t>
+            </a:r>
+            <a:endParaRPr lang="en-AU"/>
+          </a:p>
+        </p:txBody>
+      </p:sp>
+      <p:sp>
+        <p:nvSpPr>
+          <p:cNvPr id="6" name="Footer Placeholder 5"/>
+          <p:cNvSpPr>
+            <a:spLocks noGrp="1"/>
+          </p:cNvSpPr>
+          <p:nvPr>
+            <p:ph type="ftr" sz="quarter" idx="4"/>
+          </p:nvPr>
+        </p:nvSpPr>
+        <p:spPr>
+          <a:xfrm>
+            <a:off x="0" y="8685213"/>
+            <a:ext cx="2971800" cy="458787"/>
+          </a:xfrm>
+          <a:prstGeom prst="rect">
+            <a:avLst/>
+          </a:prstGeom>
+        </p:spPr>
+        <p:txBody>
+          <a:bodyPr vert="horz" lIns="91440" tIns="45720" rIns="91440" bIns="45720" rtlCol="0" anchor="b"/>
+          <a:lstStyle>
+            <a:lvl1pPr algn="l">
+              <a:defRPr sz="1200"/>
+            </a:lvl1pPr>
+          </a:lstStyle>
+          <a:p>
+            <a:endParaRPr lang="en-AU"/>
+          </a:p>
+        </p:txBody>
+      </p:sp>
+      <p:sp>
+        <p:nvSpPr>
+          <p:cNvPr id="7" name="Slide Number Placeholder 6"/>
+          <p:cNvSpPr>
+            <a:spLocks noGrp="1"/>
+          </p:cNvSpPr>
+          <p:nvPr>
+            <p:ph type="sldNum" sz="quarter" idx="5"/>
+          </p:nvPr>
+        </p:nvSpPr>
+        <p:spPr>
+          <a:xfrm>
+            <a:off x="3884613" y="8685213"/>
+            <a:ext cx="2971800" cy="458787"/>
+          </a:xfrm>
+          <a:prstGeom prst="rect">
+            <a:avLst/>
+          </a:prstGeom>
+        </p:spPr>
+        <p:txBody>
+          <a:bodyPr vert="horz" lIns="91440" tIns="45720" rIns="91440" bIns="45720" rtlCol="0" anchor="b"/>
+          <a:lstStyle>
+            <a:lvl1pPr algn="r">
+              <a:defRPr sz="1200"/>
+            </a:lvl1pPr>
+          </a:lstStyle>
+          <a:p>
+            <a:fld id="{0613BFA8-B40D-8949-BB1E-9E539455EB6E}" type="slidenum">
+              <a:rPr lang="en-AU" smtClean="0"/>
+              <a:t>‹#›</a:t>
+            </a:fld>
+            <a:endParaRPr lang="en-AU"/>
+          </a:p>
+        </p:txBody>
+      </p:sp>
+    </p:spTree>
+    <p:extLst>
+      <p:ext uri="{BB962C8B-B14F-4D97-AF65-F5344CB8AC3E}">
+        <p14:creationId xmlns:p14="http://schemas.microsoft.com/office/powerpoint/2010/main" val="381558435"/>
+      </p:ext>
+    </p:extLst>
+  </p:cSld>
+  <p:clrMap bg1="lt1" tx1="dk1" bg2="lt2" tx2="dk2" accent1="accent1" accent2="accent2" accent3="accent3" accent4="accent4" accent5="accent5" accent6="accent6" hlink="hlink" folHlink="folHlink"/>
+  <p:notesStyle>
+    <a:lvl1pPr marL="0" algn="l" defTabSz="914400" rtl="0" eaLnBrk="1" latinLnBrk="0" hangingPunct="1">
+      <a:defRPr sz="1200" kern="1200">
+        <a:solidFill>
+          <a:schemeClr val="tx1"/>
+        </a:solidFill>
+        <a:latin typeface="+mn-lt"/>
+        <a:ea typeface="+mn-ea"/>
+        <a:cs typeface="+mn-cs"/>
+      </a:defRPr>
+    </a:lvl1pPr>
+    <a:lvl2pPr marL="457200" algn="l" defTabSz="914400" rtl="0" eaLnBrk="1" latinLnBrk="0" hangingPunct="1">
+      <a:defRPr sz="1200" kern="1200">
+        <a:solidFill>
+          <a:schemeClr val="tx1"/>
+        </a:solidFill>
+        <a:latin typeface="+mn-lt"/>
+        <a:ea typeface="+mn-ea"/>
+        <a:cs typeface="+mn-cs"/>
+      </a:defRPr>
+    </a:lvl2pPr>
+    <a:lvl3pPr marL="914400" algn="l" defTabSz="914400" rtl="0" eaLnBrk="1" latinLnBrk="0" hangingPunct="1">
+      <a:defRPr sz="1200" kern="1200">
+        <a:solidFill>
+          <a:schemeClr val="tx1"/>
+        </a:solidFill>
+        <a:latin typeface="+mn-lt"/>
+        <a:ea typeface="+mn-ea"/>
+        <a:cs typeface="+mn-cs"/>
+      </a:defRPr>
+    </a:lvl3pPr>
+    <a:lvl4pPr marL="1371600" algn="l" defTabSz="914400" rtl="0" eaLnBrk="1" latinLnBrk="0" hangingPunct="1">
+      <a:defRPr sz="1200" kern="1200">
+        <a:solidFill>
+          <a:schemeClr val="tx1"/>
+        </a:solidFill>
+        <a:latin typeface="+mn-lt"/>
+        <a:ea typeface="+mn-ea"/>
+        <a:cs typeface="+mn-cs"/>
+      </a:defRPr>
+    </a:lvl4pPr>
+    <a:lvl5pPr marL="1828800" algn="l" defTabSz="914400" rtl="0" eaLnBrk="1" latinLnBrk="0" hangingPunct="1">
+      <a:defRPr sz="1200" kern="1200">
+        <a:solidFill>
+          <a:schemeClr val="tx1"/>
+        </a:solidFill>
+        <a:latin typeface="+mn-lt"/>
+        <a:ea typeface="+mn-ea"/>
+        <a:cs typeface="+mn-cs"/>
+      </a:defRPr>
+    </a:lvl5pPr>
+    <a:lvl6pPr marL="2286000" algn="l" defTabSz="914400" rtl="0" eaLnBrk="1" latinLnBrk="0" hangingPunct="1">
+      <a:defRPr sz="1200" kern="1200">
+        <a:solidFill>
+          <a:schemeClr val="tx1"/>
+        </a:solidFill>
+        <a:latin typeface="+mn-lt"/>
+        <a:ea typeface="+mn-ea"/>
+        <a:cs typeface="+mn-cs"/>
+      </a:defRPr>
+    </a:lvl6pPr>
+    <a:lvl7pPr marL="2743200" algn="l" defTabSz="914400" rtl="0" eaLnBrk="1" latinLnBrk="0" hangingPunct="1">
+      <a:defRPr sz="1200" kern="1200">
+        <a:solidFill>
+          <a:schemeClr val="tx1"/>
+        </a:solidFill>
+        <a:latin typeface="+mn-lt"/>
+        <a:ea typeface="+mn-ea"/>
+        <a:cs typeface="+mn-cs"/>
+      </a:defRPr>
+    </a:lvl7pPr>
+    <a:lvl8pPr marL="3200400" algn="l" defTabSz="914400" rtl="0" eaLnBrk="1" latinLnBrk="0" hangingPunct="1">
+      <a:defRPr sz="1200" kern="1200">
+        <a:solidFill>
+          <a:schemeClr val="tx1"/>
+        </a:solidFill>
+        <a:latin typeface="+mn-lt"/>
+        <a:ea typeface="+mn-ea"/>
+        <a:cs typeface="+mn-cs"/>
+      </a:defRPr>
+    </a:lvl8pPr>
+    <a:lvl9pPr marL="3657600" algn="l" defTabSz="914400" rtl="0" eaLnBrk="1" latinLnBrk="0" hangingPunct="1">
+      <a:defRPr sz="1200" kern="1200">
+        <a:solidFill>
+          <a:schemeClr val="tx1"/>
+        </a:solidFill>
+        <a:latin typeface="+mn-lt"/>
+        <a:ea typeface="+mn-ea"/>
+        <a:cs typeface="+mn-cs"/>
+      </a:defRPr>
+    </a:lvl9pPr>
+  </p:notesStyle>
+</p:notesMaster>
+</file>
+
+<file path=ppt/notesSlides/notesSlide1.xml><?xml version="1.0" encoding="utf-8"?>
+<p:notes xmlns:a="http://schemas.openxmlformats.org/drawingml/2006/main" xmlns:r="http://schemas.openxmlformats.org/officeDocument/2006/relationships" xmlns:p="http://schemas.openxmlformats.org/presentationml/2006/main">
+  <p:cSld>
+    <p:spTree>
+      <p:nvGrpSpPr>
+        <p:cNvPr id="1" name=""/>
+        <p:cNvGrpSpPr/>
+        <p:nvPr/>
+      </p:nvGrpSpPr>
+      <p:grpSpPr>
+        <a:xfrm>
+          <a:off x="0" y="0"/>
+          <a:ext cx="0" cy="0"/>
+          <a:chOff x="0" y="0"/>
+          <a:chExt cx="0" cy="0"/>
+        </a:xfrm>
+      </p:grpSpPr>
+      <p:sp>
+        <p:nvSpPr>
+          <p:cNvPr id="2" name="Slide Image Placeholder 1"/>
+          <p:cNvSpPr>
+            <a:spLocks noGrp="1" noRot="1" noChangeAspect="1"/>
+          </p:cNvSpPr>
+          <p:nvPr>
+            <p:ph type="sldImg"/>
+          </p:nvPr>
+        </p:nvSpPr>
+        <p:spPr/>
+      </p:sp>
+      <p:sp>
+        <p:nvSpPr>
+          <p:cNvPr id="3" name="Notes Placeholder 2"/>
+          <p:cNvSpPr>
+            <a:spLocks noGrp="1"/>
+          </p:cNvSpPr>
+          <p:nvPr>
+            <p:ph type="body" idx="1"/>
+          </p:nvPr>
+        </p:nvSpPr>
+        <p:spPr/>
+        <p:txBody>
+          <a:bodyPr/>
+          <a:lstStyle/>
+          <a:p>
+            <a:endParaRPr lang="en-AU" dirty="0"/>
+          </a:p>
+        </p:txBody>
+      </p:sp>
+      <p:sp>
+        <p:nvSpPr>
+          <p:cNvPr id="4" name="Slide Number Placeholder 3"/>
+          <p:cNvSpPr>
+            <a:spLocks noGrp="1"/>
+          </p:cNvSpPr>
+          <p:nvPr>
+            <p:ph type="sldNum" sz="quarter" idx="5"/>
+          </p:nvPr>
+        </p:nvSpPr>
+        <p:spPr/>
+        <p:txBody>
+          <a:bodyPr/>
+          <a:lstStyle/>
+          <a:p>
+            <a:fld id="{0613BFA8-B40D-8949-BB1E-9E539455EB6E}" type="slidenum">
+              <a:rPr lang="en-AU" smtClean="0"/>
+              <a:t>1</a:t>
+            </a:fld>
+            <a:endParaRPr lang="en-AU"/>
+          </a:p>
+        </p:txBody>
+      </p:sp>
+    </p:spTree>
+    <p:extLst>
+      <p:ext uri="{BB962C8B-B14F-4D97-AF65-F5344CB8AC3E}">
+        <p14:creationId xmlns:p14="http://schemas.microsoft.com/office/powerpoint/2010/main" val="1126974035"/>
+      </p:ext>
+    </p:extLst>
+  </p:cSld>
+  <p:clrMapOvr>
+    <a:masterClrMapping/>
+  </p:clrMapOvr>
+</p:notes>
+</file>
+
 <file path=ppt/slideLayouts/slideLayout1.xml><?xml version="1.0" encoding="utf-8"?>
 <p:sldLayout xmlns:a="http://schemas.openxmlformats.org/drawingml/2006/main" xmlns:r="http://schemas.openxmlformats.org/officeDocument/2006/relationships" xmlns:p="http://schemas.openxmlformats.org/presentationml/2006/main" type="title" preserve="1">
   <p:cSld name="Title Slide">
@@ -1734,7 +2169,7 @@
           <a:p>
             <a:fld id="{ACCEE0A9-7BBF-D64C-96E2-5C4F18339E75}" type="datetimeFigureOut">
               <a:rPr lang="en-AU" smtClean="0"/>
-              <a:t>26/5/20</a:t>
+              <a:t>28/5/20</a:t>
             </a:fld>
             <a:endParaRPr lang="en-AU"/>
           </a:p>
@@ -1934,7 +2369,7 @@
           <a:p>
             <a:fld id="{ACCEE0A9-7BBF-D64C-96E2-5C4F18339E75}" type="datetimeFigureOut">
               <a:rPr lang="en-AU" smtClean="0"/>
-              <a:t>26/5/20</a:t>
+              <a:t>28/5/20</a:t>
             </a:fld>
             <a:endParaRPr lang="en-AU"/>
           </a:p>
@@ -2144,7 +2579,7 @@
           <a:p>
             <a:fld id="{ACCEE0A9-7BBF-D64C-96E2-5C4F18339E75}" type="datetimeFigureOut">
               <a:rPr lang="en-AU" smtClean="0"/>
-              <a:t>26/5/20</a:t>
+              <a:t>28/5/20</a:t>
             </a:fld>
             <a:endParaRPr lang="en-AU"/>
           </a:p>
@@ -2344,7 +2779,7 @@
           <a:p>
             <a:fld id="{ACCEE0A9-7BBF-D64C-96E2-5C4F18339E75}" type="datetimeFigureOut">
               <a:rPr lang="en-AU" smtClean="0"/>
-              <a:t>26/5/20</a:t>
+              <a:t>28/5/20</a:t>
             </a:fld>
             <a:endParaRPr lang="en-AU"/>
           </a:p>
@@ -2620,7 +3055,7 @@
           <a:p>
             <a:fld id="{ACCEE0A9-7BBF-D64C-96E2-5C4F18339E75}" type="datetimeFigureOut">
               <a:rPr lang="en-AU" smtClean="0"/>
-              <a:t>26/5/20</a:t>
+              <a:t>28/5/20</a:t>
             </a:fld>
             <a:endParaRPr lang="en-AU"/>
           </a:p>
@@ -2888,7 +3323,7 @@
           <a:p>
             <a:fld id="{ACCEE0A9-7BBF-D64C-96E2-5C4F18339E75}" type="datetimeFigureOut">
               <a:rPr lang="en-AU" smtClean="0"/>
-              <a:t>26/5/20</a:t>
+              <a:t>28/5/20</a:t>
             </a:fld>
             <a:endParaRPr lang="en-AU"/>
           </a:p>
@@ -3303,7 +3738,7 @@
           <a:p>
             <a:fld id="{ACCEE0A9-7BBF-D64C-96E2-5C4F18339E75}" type="datetimeFigureOut">
               <a:rPr lang="en-AU" smtClean="0"/>
-              <a:t>26/5/20</a:t>
+              <a:t>28/5/20</a:t>
             </a:fld>
             <a:endParaRPr lang="en-AU"/>
           </a:p>
@@ -3445,7 +3880,7 @@
           <a:p>
             <a:fld id="{ACCEE0A9-7BBF-D64C-96E2-5C4F18339E75}" type="datetimeFigureOut">
               <a:rPr lang="en-AU" smtClean="0"/>
-              <a:t>26/5/20</a:t>
+              <a:t>28/5/20</a:t>
             </a:fld>
             <a:endParaRPr lang="en-AU"/>
           </a:p>
@@ -3558,7 +3993,7 @@
           <a:p>
             <a:fld id="{ACCEE0A9-7BBF-D64C-96E2-5C4F18339E75}" type="datetimeFigureOut">
               <a:rPr lang="en-AU" smtClean="0"/>
-              <a:t>26/5/20</a:t>
+              <a:t>28/5/20</a:t>
             </a:fld>
             <a:endParaRPr lang="en-AU"/>
           </a:p>
@@ -3871,7 +4306,7 @@
           <a:p>
             <a:fld id="{ACCEE0A9-7BBF-D64C-96E2-5C4F18339E75}" type="datetimeFigureOut">
               <a:rPr lang="en-AU" smtClean="0"/>
-              <a:t>26/5/20</a:t>
+              <a:t>28/5/20</a:t>
             </a:fld>
             <a:endParaRPr lang="en-AU"/>
           </a:p>
@@ -4160,7 +4595,7 @@
           <a:p>
             <a:fld id="{ACCEE0A9-7BBF-D64C-96E2-5C4F18339E75}" type="datetimeFigureOut">
               <a:rPr lang="en-AU" smtClean="0"/>
-              <a:t>26/5/20</a:t>
+              <a:t>28/5/20</a:t>
             </a:fld>
             <a:endParaRPr lang="en-AU"/>
           </a:p>
@@ -4403,7 +4838,7 @@
           <a:p>
             <a:fld id="{ACCEE0A9-7BBF-D64C-96E2-5C4F18339E75}" type="datetimeFigureOut">
               <a:rPr lang="en-AU" smtClean="0"/>
-              <a:t>26/5/20</a:t>
+              <a:t>28/5/20</a:t>
             </a:fld>
             <a:endParaRPr lang="en-AU"/>
           </a:p>
@@ -7016,7 +7451,7 @@
             </a:r>
             <a:r>
               <a:rPr lang="en-AU" b="1" dirty="0"/>
-              <a:t>load(</a:t>
+              <a:t>load(“</a:t>
             </a:r>
             <a:r>
               <a:rPr lang="en-AU" b="1" dirty="0" err="1"/>
@@ -7024,7 +7459,7 @@
             </a:r>
             <a:r>
               <a:rPr lang="en-AU" b="1" dirty="0"/>
-              <a:t>)</a:t>
+              <a:t>”)</a:t>
             </a:r>
           </a:p>
           <a:p>
@@ -7763,7 +8198,7 @@
           <p:cNvPr id="2" name="Title 1">
             <a:extLst>
               <a:ext uri="{FF2B5EF4-FFF2-40B4-BE49-F238E27FC236}">
-                <a16:creationId xmlns:a16="http://schemas.microsoft.com/office/drawing/2014/main" id="{07FC1E74-EEC2-3C49-8998-A7EE3FAE4620}"/>
+                <a16:creationId xmlns:a16="http://schemas.microsoft.com/office/drawing/2014/main" id="{A0E1D6D8-CF70-224A-9920-5DBE6D7EE635}"/>
               </a:ext>
             </a:extLst>
           </p:cNvPr>
@@ -7781,7 +8216,7 @@
           <a:p>
             <a:r>
               <a:rPr lang="en-AU" dirty="0"/>
-              <a:t>Box Plots with </a:t>
+              <a:t>Violin Plots with </a:t>
             </a:r>
             <a:r>
               <a:rPr lang="en-AU" dirty="0" err="1"/>
@@ -7799,7 +8234,7 @@
           <p:cNvPr id="3" name="Content Placeholder 2">
             <a:extLst>
               <a:ext uri="{FF2B5EF4-FFF2-40B4-BE49-F238E27FC236}">
-                <a16:creationId xmlns:a16="http://schemas.microsoft.com/office/drawing/2014/main" id="{3F888EF5-49B7-5847-A219-FBBE431079E9}"/>
+                <a16:creationId xmlns:a16="http://schemas.microsoft.com/office/drawing/2014/main" id="{298BAAE6-6BC2-0A4F-940B-177AD67AC236}"/>
               </a:ext>
             </a:extLst>
           </p:cNvPr>
@@ -7817,7 +8252,7 @@
           <a:p>
             <a:r>
               <a:rPr lang="en-AU" dirty="0"/>
-              <a:t>Create simple boxplot with </a:t>
+              <a:t>Create a simple violin plot with</a:t>
             </a:r>
           </a:p>
           <a:p>
@@ -7862,11 +8297,11 @@
             </a:r>
             <a:r>
               <a:rPr lang="en-AU" b="1" dirty="0" err="1"/>
-              <a:t>geom_boxplot</a:t>
+              <a:t>geom_violin</a:t>
             </a:r>
             <a:r>
               <a:rPr lang="en-AU" b="1" dirty="0"/>
-              <a:t>()</a:t>
+              <a:t>(trim = FALSE)</a:t>
             </a:r>
           </a:p>
         </p:txBody>
@@ -7874,7 +8309,7 @@
     </p:spTree>
     <p:extLst>
       <p:ext uri="{BB962C8B-B14F-4D97-AF65-F5344CB8AC3E}">
-        <p14:creationId xmlns:p14="http://schemas.microsoft.com/office/powerpoint/2010/main" val="1489586080"/>
+        <p14:creationId xmlns:p14="http://schemas.microsoft.com/office/powerpoint/2010/main" val="1953619556"/>
       </p:ext>
     </p:extLst>
   </p:cSld>
@@ -7906,7 +8341,7 @@
           <p:cNvPr id="2" name="Title 1">
             <a:extLst>
               <a:ext uri="{FF2B5EF4-FFF2-40B4-BE49-F238E27FC236}">
-                <a16:creationId xmlns:a16="http://schemas.microsoft.com/office/drawing/2014/main" id="{07FC1E74-EEC2-3C49-8998-A7EE3FAE4620}"/>
+                <a16:creationId xmlns:a16="http://schemas.microsoft.com/office/drawing/2014/main" id="{A0E1D6D8-CF70-224A-9920-5DBE6D7EE635}"/>
               </a:ext>
             </a:extLst>
           </p:cNvPr>
@@ -7924,7 +8359,7 @@
           <a:p>
             <a:r>
               <a:rPr lang="en-AU" dirty="0"/>
-              <a:t>Box Plots with </a:t>
+              <a:t>Violin Plots with </a:t>
             </a:r>
             <a:r>
               <a:rPr lang="en-AU" dirty="0" err="1"/>
@@ -7942,7 +8377,7 @@
           <p:cNvPr id="3" name="Content Placeholder 2">
             <a:extLst>
               <a:ext uri="{FF2B5EF4-FFF2-40B4-BE49-F238E27FC236}">
-                <a16:creationId xmlns:a16="http://schemas.microsoft.com/office/drawing/2014/main" id="{3F888EF5-49B7-5847-A219-FBBE431079E9}"/>
+                <a16:creationId xmlns:a16="http://schemas.microsoft.com/office/drawing/2014/main" id="{298BAAE6-6BC2-0A4F-940B-177AD67AC236}"/>
               </a:ext>
             </a:extLst>
           </p:cNvPr>
@@ -7960,7 +8395,149 @@
           <a:p>
             <a:r>
               <a:rPr lang="en-AU" dirty="0"/>
-              <a:t>Add data points with </a:t>
+              <a:t>Add a box plot and data points</a:t>
+            </a:r>
+          </a:p>
+          <a:p>
+            <a:endParaRPr lang="en-AU" dirty="0"/>
+          </a:p>
+          <a:p>
+            <a:pPr marL="0" indent="0">
+              <a:buNone/>
+            </a:pPr>
+            <a:r>
+              <a:rPr lang="en-AU" b="1" dirty="0" err="1">
+                <a:solidFill>
+                  <a:schemeClr val="tx1">
+                    <a:lumMod val="65000"/>
+                    <a:lumOff val="35000"/>
+                  </a:schemeClr>
+                </a:solidFill>
+              </a:rPr>
+              <a:t>ggplot</a:t>
+            </a:r>
+            <a:r>
+              <a:rPr lang="en-AU" b="1" dirty="0">
+                <a:solidFill>
+                  <a:schemeClr val="tx1">
+                    <a:lumMod val="65000"/>
+                    <a:lumOff val="35000"/>
+                  </a:schemeClr>
+                </a:solidFill>
+              </a:rPr>
+              <a:t>(data = </a:t>
+            </a:r>
+            <a:r>
+              <a:rPr lang="en-AU" b="1" dirty="0" err="1">
+                <a:solidFill>
+                  <a:schemeClr val="tx1">
+                    <a:lumMod val="65000"/>
+                    <a:lumOff val="35000"/>
+                  </a:schemeClr>
+                </a:solidFill>
+              </a:rPr>
+              <a:t>my_data</a:t>
+            </a:r>
+            <a:r>
+              <a:rPr lang="en-AU" b="1" dirty="0">
+                <a:solidFill>
+                  <a:schemeClr val="tx1">
+                    <a:lumMod val="65000"/>
+                    <a:lumOff val="35000"/>
+                  </a:schemeClr>
+                </a:solidFill>
+              </a:rPr>
+              <a:t>, </a:t>
+            </a:r>
+            <a:r>
+              <a:rPr lang="en-AU" b="1" dirty="0" err="1">
+                <a:solidFill>
+                  <a:schemeClr val="tx1">
+                    <a:lumMod val="65000"/>
+                    <a:lumOff val="35000"/>
+                  </a:schemeClr>
+                </a:solidFill>
+              </a:rPr>
+              <a:t>aes</a:t>
+            </a:r>
+            <a:r>
+              <a:rPr lang="en-AU" b="1" dirty="0">
+                <a:solidFill>
+                  <a:schemeClr val="tx1">
+                    <a:lumMod val="65000"/>
+                    <a:lumOff val="35000"/>
+                  </a:schemeClr>
+                </a:solidFill>
+              </a:rPr>
+              <a:t>(x = condition, y = RT)) +</a:t>
+            </a:r>
+          </a:p>
+          <a:p>
+            <a:pPr marL="0" indent="0">
+              <a:buNone/>
+            </a:pPr>
+            <a:r>
+              <a:rPr lang="en-AU" b="1" dirty="0">
+                <a:solidFill>
+                  <a:schemeClr val="tx1">
+                    <a:lumMod val="65000"/>
+                    <a:lumOff val="35000"/>
+                  </a:schemeClr>
+                </a:solidFill>
+              </a:rPr>
+              <a:t>  </a:t>
+            </a:r>
+            <a:r>
+              <a:rPr lang="en-AU" b="1" dirty="0" err="1">
+                <a:solidFill>
+                  <a:schemeClr val="tx1">
+                    <a:lumMod val="65000"/>
+                    <a:lumOff val="35000"/>
+                  </a:schemeClr>
+                </a:solidFill>
+              </a:rPr>
+              <a:t>geom_violin</a:t>
+            </a:r>
+            <a:r>
+              <a:rPr lang="en-AU" b="1" dirty="0">
+                <a:solidFill>
+                  <a:schemeClr val="tx1">
+                    <a:lumMod val="65000"/>
+                    <a:lumOff val="35000"/>
+                  </a:schemeClr>
+                </a:solidFill>
+              </a:rPr>
+              <a:t>(trim = FALSE) </a:t>
+            </a:r>
+            <a:r>
+              <a:rPr lang="en-AU" b="1" dirty="0"/>
+              <a:t>+</a:t>
+            </a:r>
+          </a:p>
+          <a:p>
+            <a:pPr marL="0" indent="0">
+              <a:buNone/>
+            </a:pPr>
+            <a:r>
+              <a:rPr lang="en-AU" b="1" dirty="0"/>
+              <a:t>  </a:t>
+            </a:r>
+            <a:r>
+              <a:rPr lang="en-AU" b="1" dirty="0" err="1"/>
+              <a:t>geom_boxplot</a:t>
+            </a:r>
+            <a:r>
+              <a:rPr lang="en-AU" b="1" dirty="0"/>
+              <a:t>(width = 0.1) +</a:t>
+            </a:r>
+          </a:p>
+          <a:p>
+            <a:pPr marL="0" indent="0">
+              <a:buNone/>
+            </a:pPr>
+            <a:r>
+              <a:rPr lang="en-AU" b="1" dirty="0"/>
+              <a:t>  </a:t>
             </a:r>
             <a:r>
               <a:rPr lang="en-AU" b="1" dirty="0" err="1"/>
@@ -7968,140 +8545,6 @@
             </a:r>
             <a:r>
               <a:rPr lang="en-AU" b="1" dirty="0"/>
-              <a:t>()</a:t>
-            </a:r>
-            <a:endParaRPr lang="en-AU" dirty="0"/>
-          </a:p>
-          <a:p>
-            <a:endParaRPr lang="en-AU" dirty="0"/>
-          </a:p>
-          <a:p>
-            <a:pPr marL="0" indent="0">
-              <a:buNone/>
-            </a:pPr>
-            <a:r>
-              <a:rPr lang="en-AU" b="1" dirty="0" err="1">
-                <a:solidFill>
-                  <a:schemeClr val="tx1">
-                    <a:lumMod val="65000"/>
-                    <a:lumOff val="35000"/>
-                  </a:schemeClr>
-                </a:solidFill>
-              </a:rPr>
-              <a:t>ggplot</a:t>
-            </a:r>
-            <a:r>
-              <a:rPr lang="en-AU" b="1" dirty="0">
-                <a:solidFill>
-                  <a:schemeClr val="tx1">
-                    <a:lumMod val="65000"/>
-                    <a:lumOff val="35000"/>
-                  </a:schemeClr>
-                </a:solidFill>
-              </a:rPr>
-              <a:t>(data = </a:t>
-            </a:r>
-            <a:r>
-              <a:rPr lang="en-AU" b="1" dirty="0" err="1">
-                <a:solidFill>
-                  <a:schemeClr val="tx1">
-                    <a:lumMod val="65000"/>
-                    <a:lumOff val="35000"/>
-                  </a:schemeClr>
-                </a:solidFill>
-              </a:rPr>
-              <a:t>my_data</a:t>
-            </a:r>
-            <a:r>
-              <a:rPr lang="en-AU" b="1" dirty="0">
-                <a:solidFill>
-                  <a:schemeClr val="tx1">
-                    <a:lumMod val="65000"/>
-                    <a:lumOff val="35000"/>
-                  </a:schemeClr>
-                </a:solidFill>
-              </a:rPr>
-              <a:t>, </a:t>
-            </a:r>
-            <a:r>
-              <a:rPr lang="en-AU" b="1" dirty="0" err="1">
-                <a:solidFill>
-                  <a:schemeClr val="tx1">
-                    <a:lumMod val="65000"/>
-                    <a:lumOff val="35000"/>
-                  </a:schemeClr>
-                </a:solidFill>
-              </a:rPr>
-              <a:t>aes</a:t>
-            </a:r>
-            <a:r>
-              <a:rPr lang="en-AU" b="1" dirty="0">
-                <a:solidFill>
-                  <a:schemeClr val="tx1">
-                    <a:lumMod val="65000"/>
-                    <a:lumOff val="35000"/>
-                  </a:schemeClr>
-                </a:solidFill>
-              </a:rPr>
-              <a:t>(x = condition, y = RT)) +</a:t>
-            </a:r>
-          </a:p>
-          <a:p>
-            <a:pPr marL="0" indent="0">
-              <a:buNone/>
-            </a:pPr>
-            <a:r>
-              <a:rPr lang="en-AU" b="1" dirty="0">
-                <a:solidFill>
-                  <a:schemeClr val="tx1">
-                    <a:lumMod val="65000"/>
-                    <a:lumOff val="35000"/>
-                  </a:schemeClr>
-                </a:solidFill>
-              </a:rPr>
-              <a:t>  </a:t>
-            </a:r>
-            <a:r>
-              <a:rPr lang="en-AU" b="1" dirty="0" err="1">
-                <a:solidFill>
-                  <a:schemeClr val="tx1">
-                    <a:lumMod val="65000"/>
-                    <a:lumOff val="35000"/>
-                  </a:schemeClr>
-                </a:solidFill>
-              </a:rPr>
-              <a:t>geom_boxplot</a:t>
-            </a:r>
-            <a:r>
-              <a:rPr lang="en-AU" b="1" dirty="0">
-                <a:solidFill>
-                  <a:schemeClr val="tx1">
-                    <a:lumMod val="65000"/>
-                    <a:lumOff val="35000"/>
-                  </a:schemeClr>
-                </a:solidFill>
-              </a:rPr>
-              <a:t>() </a:t>
-            </a:r>
-            <a:r>
-              <a:rPr lang="en-AU" b="1" dirty="0"/>
-              <a:t>+</a:t>
-            </a:r>
-          </a:p>
-          <a:p>
-            <a:pPr marL="0" indent="0">
-              <a:buNone/>
-            </a:pPr>
-            <a:r>
-              <a:rPr lang="en-AU" b="1" dirty="0"/>
-              <a:t>  </a:t>
-            </a:r>
-            <a:r>
-              <a:rPr lang="en-AU" b="1" dirty="0" err="1"/>
-              <a:t>geom_dotplot</a:t>
-            </a:r>
-            <a:r>
-              <a:rPr lang="en-AU" b="1" dirty="0"/>
               <a:t>(</a:t>
             </a:r>
             <a:r>
@@ -8126,19 +8569,7 @@
             </a:r>
             <a:r>
               <a:rPr lang="en-AU" b="1" dirty="0"/>
-              <a:t>’)</a:t>
-            </a:r>
-          </a:p>
-          <a:p>
-            <a:pPr marL="0" indent="0">
-              <a:buNone/>
-            </a:pPr>
-            <a:endParaRPr lang="en-AU" b="1" dirty="0"/>
-          </a:p>
-          <a:p>
-            <a:r>
-              <a:rPr lang="en-AU" dirty="0"/>
-              <a:t>TIP: You can change the size of the dots using the </a:t>
+              <a:t>', </a:t>
             </a:r>
             <a:r>
               <a:rPr lang="en-AU" b="1" dirty="0" err="1"/>
@@ -8146,28 +8577,15 @@
             </a:r>
             <a:r>
               <a:rPr lang="en-AU" b="1" dirty="0"/>
-              <a:t> =  </a:t>
-            </a:r>
-            <a:r>
-              <a:rPr lang="en-AU" dirty="0"/>
-              <a:t>argument in </a:t>
-            </a:r>
-            <a:r>
-              <a:rPr lang="en-AU" b="1" dirty="0" err="1"/>
-              <a:t>geom_dotplot</a:t>
-            </a:r>
-            <a:r>
-              <a:rPr lang="en-AU" b="1" dirty="0"/>
-              <a:t>()</a:t>
-            </a:r>
-            <a:endParaRPr lang="en-AU" dirty="0"/>
+              <a:t> = .5)</a:t>
+            </a:r>
           </a:p>
         </p:txBody>
       </p:sp>
     </p:spTree>
     <p:extLst>
       <p:ext uri="{BB962C8B-B14F-4D97-AF65-F5344CB8AC3E}">
-        <p14:creationId xmlns:p14="http://schemas.microsoft.com/office/powerpoint/2010/main" val="2306554525"/>
+        <p14:creationId xmlns:p14="http://schemas.microsoft.com/office/powerpoint/2010/main" val="3015158901"/>
       </p:ext>
     </p:extLst>
   </p:cSld>
@@ -8246,14 +8664,21 @@
             <p:ph idx="1"/>
           </p:nvPr>
         </p:nvSpPr>
-        <p:spPr/>
-        <p:txBody>
-          <a:bodyPr/>
+        <p:spPr>
+          <a:xfrm>
+            <a:off x="654628" y="1794452"/>
+            <a:ext cx="11208327" cy="4351338"/>
+          </a:xfrm>
+        </p:spPr>
+        <p:txBody>
+          <a:bodyPr>
+            <a:normAutofit fontScale="77500" lnSpcReduction="20000"/>
+          </a:bodyPr>
           <a:lstStyle/>
           <a:p>
             <a:r>
               <a:rPr lang="en-AU" dirty="0"/>
-              <a:t>Create a simple violin plot with</a:t>
+              <a:t>Change colour by condition and edit labels</a:t>
             </a:r>
           </a:p>
           <a:p>
@@ -8264,28 +8689,321 @@
               <a:buNone/>
             </a:pPr>
             <a:r>
-              <a:rPr lang="en-AU" b="1" dirty="0" err="1"/>
+              <a:rPr lang="en-AU" b="1" dirty="0" err="1">
+                <a:solidFill>
+                  <a:schemeClr val="tx1">
+                    <a:lumMod val="65000"/>
+                    <a:lumOff val="35000"/>
+                  </a:schemeClr>
+                </a:solidFill>
+              </a:rPr>
               <a:t>ggplot</a:t>
             </a:r>
             <a:r>
+              <a:rPr lang="en-AU" b="1" dirty="0">
+                <a:solidFill>
+                  <a:schemeClr val="tx1">
+                    <a:lumMod val="65000"/>
+                    <a:lumOff val="35000"/>
+                  </a:schemeClr>
+                </a:solidFill>
+              </a:rPr>
+              <a:t>(data = </a:t>
+            </a:r>
+            <a:r>
+              <a:rPr lang="en-AU" b="1" dirty="0" err="1">
+                <a:solidFill>
+                  <a:schemeClr val="tx1">
+                    <a:lumMod val="65000"/>
+                    <a:lumOff val="35000"/>
+                  </a:schemeClr>
+                </a:solidFill>
+              </a:rPr>
+              <a:t>my_data</a:t>
+            </a:r>
+            <a:r>
+              <a:rPr lang="en-AU" b="1" dirty="0">
+                <a:solidFill>
+                  <a:schemeClr val="tx1">
+                    <a:lumMod val="65000"/>
+                    <a:lumOff val="35000"/>
+                  </a:schemeClr>
+                </a:solidFill>
+              </a:rPr>
+              <a:t>, </a:t>
+            </a:r>
+            <a:r>
+              <a:rPr lang="en-AU" b="1" dirty="0" err="1">
+                <a:solidFill>
+                  <a:schemeClr val="tx1">
+                    <a:lumMod val="65000"/>
+                    <a:lumOff val="35000"/>
+                  </a:schemeClr>
+                </a:solidFill>
+              </a:rPr>
+              <a:t>aes</a:t>
+            </a:r>
+            <a:r>
+              <a:rPr lang="en-AU" b="1" dirty="0">
+                <a:solidFill>
+                  <a:schemeClr val="tx1">
+                    <a:lumMod val="65000"/>
+                    <a:lumOff val="35000"/>
+                  </a:schemeClr>
+                </a:solidFill>
+              </a:rPr>
+              <a:t>(x = condition, y = RT, </a:t>
+            </a:r>
+            <a:r>
               <a:rPr lang="en-AU" b="1" dirty="0"/>
-              <a:t>(data = </a:t>
-            </a:r>
-            <a:r>
-              <a:rPr lang="en-AU" b="1" dirty="0" err="1"/>
-              <a:t>my_data</a:t>
+              <a:t>fill = condition</a:t>
+            </a:r>
+            <a:r>
+              <a:rPr lang="en-AU" b="1" dirty="0">
+                <a:solidFill>
+                  <a:schemeClr val="tx1">
+                    <a:lumMod val="65000"/>
+                    <a:lumOff val="35000"/>
+                  </a:schemeClr>
+                </a:solidFill>
+              </a:rPr>
+              <a:t>)) +</a:t>
+            </a:r>
+          </a:p>
+          <a:p>
+            <a:pPr marL="0" indent="0">
+              <a:buNone/>
+            </a:pPr>
+            <a:r>
+              <a:rPr lang="en-AU" b="1" dirty="0">
+                <a:solidFill>
+                  <a:schemeClr val="tx1">
+                    <a:lumMod val="65000"/>
+                    <a:lumOff val="35000"/>
+                  </a:schemeClr>
+                </a:solidFill>
+              </a:rPr>
+              <a:t>  </a:t>
+            </a:r>
+            <a:r>
+              <a:rPr lang="en-AU" b="1" dirty="0" err="1">
+                <a:solidFill>
+                  <a:schemeClr val="tx1">
+                    <a:lumMod val="65000"/>
+                    <a:lumOff val="35000"/>
+                  </a:schemeClr>
+                </a:solidFill>
+              </a:rPr>
+              <a:t>geom_violin</a:t>
+            </a:r>
+            <a:r>
+              <a:rPr lang="en-AU" b="1" dirty="0">
+                <a:solidFill>
+                  <a:schemeClr val="tx1">
+                    <a:lumMod val="65000"/>
+                    <a:lumOff val="35000"/>
+                  </a:schemeClr>
+                </a:solidFill>
+              </a:rPr>
+              <a:t>(trim = FALSE) +</a:t>
+            </a:r>
+          </a:p>
+          <a:p>
+            <a:pPr marL="0" indent="0">
+              <a:buNone/>
+            </a:pPr>
+            <a:r>
+              <a:rPr lang="en-AU" b="1" dirty="0">
+                <a:solidFill>
+                  <a:schemeClr val="tx1">
+                    <a:lumMod val="65000"/>
+                    <a:lumOff val="35000"/>
+                  </a:schemeClr>
+                </a:solidFill>
+              </a:rPr>
+              <a:t>  </a:t>
+            </a:r>
+            <a:r>
+              <a:rPr lang="en-AU" b="1" dirty="0" err="1">
+                <a:solidFill>
+                  <a:schemeClr val="tx1">
+                    <a:lumMod val="65000"/>
+                    <a:lumOff val="35000"/>
+                  </a:schemeClr>
+                </a:solidFill>
+              </a:rPr>
+              <a:t>geom_boxplot</a:t>
+            </a:r>
+            <a:r>
+              <a:rPr lang="en-AU" b="1" dirty="0">
+                <a:solidFill>
+                  <a:schemeClr val="tx1">
+                    <a:lumMod val="65000"/>
+                    <a:lumOff val="35000"/>
+                  </a:schemeClr>
+                </a:solidFill>
+              </a:rPr>
+              <a:t>(width = 0.1</a:t>
             </a:r>
             <a:r>
               <a:rPr lang="en-AU" b="1" dirty="0"/>
-              <a:t>, </a:t>
-            </a:r>
-            <a:r>
-              <a:rPr lang="en-AU" b="1" dirty="0" err="1"/>
-              <a:t>aes</a:t>
+              <a:t>, fill = “white”</a:t>
+            </a:r>
+            <a:r>
+              <a:rPr lang="en-AU" b="1" dirty="0">
+                <a:solidFill>
+                  <a:schemeClr val="tx1">
+                    <a:lumMod val="65000"/>
+                    <a:lumOff val="35000"/>
+                  </a:schemeClr>
+                </a:solidFill>
+              </a:rPr>
+              <a:t>) +</a:t>
+            </a:r>
+          </a:p>
+          <a:p>
+            <a:pPr marL="0" indent="0">
+              <a:buNone/>
+            </a:pPr>
+            <a:r>
+              <a:rPr lang="en-AU" b="1" dirty="0">
+                <a:solidFill>
+                  <a:schemeClr val="tx1">
+                    <a:lumMod val="65000"/>
+                    <a:lumOff val="35000"/>
+                  </a:schemeClr>
+                </a:solidFill>
+              </a:rPr>
+              <a:t>  </a:t>
+            </a:r>
+            <a:r>
+              <a:rPr lang="en-AU" b="1" dirty="0" err="1">
+                <a:solidFill>
+                  <a:schemeClr val="tx1">
+                    <a:lumMod val="65000"/>
+                    <a:lumOff val="35000"/>
+                  </a:schemeClr>
+                </a:solidFill>
+              </a:rPr>
+              <a:t>geom_dotplot</a:t>
+            </a:r>
+            <a:r>
+              <a:rPr lang="en-AU" b="1" dirty="0">
+                <a:solidFill>
+                  <a:schemeClr val="tx1">
+                    <a:lumMod val="65000"/>
+                    <a:lumOff val="35000"/>
+                  </a:schemeClr>
+                </a:solidFill>
+              </a:rPr>
+              <a:t>(</a:t>
+            </a:r>
+            <a:r>
+              <a:rPr lang="en-AU" b="1" dirty="0" err="1">
+                <a:solidFill>
+                  <a:schemeClr val="tx1">
+                    <a:lumMod val="65000"/>
+                    <a:lumOff val="35000"/>
+                  </a:schemeClr>
+                </a:solidFill>
+              </a:rPr>
+              <a:t>binaxis</a:t>
+            </a:r>
+            <a:r>
+              <a:rPr lang="en-AU" b="1" dirty="0">
+                <a:solidFill>
+                  <a:schemeClr val="tx1">
+                    <a:lumMod val="65000"/>
+                    <a:lumOff val="35000"/>
+                  </a:schemeClr>
+                </a:solidFill>
+              </a:rPr>
+              <a:t> = 'y', </a:t>
+            </a:r>
+            <a:r>
+              <a:rPr lang="en-AU" b="1" dirty="0" err="1">
+                <a:solidFill>
+                  <a:schemeClr val="tx1">
+                    <a:lumMod val="65000"/>
+                    <a:lumOff val="35000"/>
+                  </a:schemeClr>
+                </a:solidFill>
+              </a:rPr>
+              <a:t>stackdir</a:t>
+            </a:r>
+            <a:r>
+              <a:rPr lang="en-AU" b="1" dirty="0">
+                <a:solidFill>
+                  <a:schemeClr val="tx1">
+                    <a:lumMod val="65000"/>
+                    <a:lumOff val="35000"/>
+                  </a:schemeClr>
+                </a:solidFill>
+              </a:rPr>
+              <a:t> = '</a:t>
+            </a:r>
+            <a:r>
+              <a:rPr lang="en-AU" b="1" dirty="0" err="1">
+                <a:solidFill>
+                  <a:schemeClr val="tx1">
+                    <a:lumMod val="65000"/>
+                    <a:lumOff val="35000"/>
+                  </a:schemeClr>
+                </a:solidFill>
+              </a:rPr>
+              <a:t>center</a:t>
+            </a:r>
+            <a:r>
+              <a:rPr lang="en-AU" b="1" dirty="0">
+                <a:solidFill>
+                  <a:schemeClr val="tx1">
+                    <a:lumMod val="65000"/>
+                    <a:lumOff val="35000"/>
+                  </a:schemeClr>
+                </a:solidFill>
+              </a:rPr>
+              <a:t>', </a:t>
+            </a:r>
+            <a:r>
+              <a:rPr lang="en-AU" b="1" dirty="0" err="1">
+                <a:solidFill>
+                  <a:schemeClr val="tx1">
+                    <a:lumMod val="65000"/>
+                    <a:lumOff val="35000"/>
+                  </a:schemeClr>
+                </a:solidFill>
+              </a:rPr>
+              <a:t>dotsize</a:t>
+            </a:r>
+            <a:r>
+              <a:rPr lang="en-AU" b="1" dirty="0">
+                <a:solidFill>
+                  <a:schemeClr val="tx1">
+                    <a:lumMod val="65000"/>
+                    <a:lumOff val="35000"/>
+                  </a:schemeClr>
+                </a:solidFill>
+              </a:rPr>
+              <a:t> = .5</a:t>
             </a:r>
             <a:r>
               <a:rPr lang="en-AU" b="1" dirty="0"/>
-              <a:t>(x = condition, y = RT)) +</a:t>
+              <a:t>, fill = “black”</a:t>
+            </a:r>
+            <a:r>
+              <a:rPr lang="en-AU" b="1" dirty="0">
+                <a:solidFill>
+                  <a:schemeClr val="tx1">
+                    <a:lumMod val="65000"/>
+                    <a:lumOff val="35000"/>
+                  </a:schemeClr>
+                </a:solidFill>
+              </a:rPr>
+              <a:t>) </a:t>
+            </a:r>
+            <a:r>
+              <a:rPr lang="en-AU" b="1" dirty="0"/>
+              <a:t>+</a:t>
             </a:r>
           </a:p>
           <a:p>
@@ -8298,11 +9016,87 @@
             </a:r>
             <a:r>
               <a:rPr lang="en-AU" b="1" dirty="0" err="1"/>
-              <a:t>geom_violin</a:t>
+              <a:t>scale_fill_brewer</a:t>
             </a:r>
             <a:r>
               <a:rPr lang="en-AU" b="1" dirty="0"/>
-              <a:t>(trim = FALSE)</a:t>
+              <a:t>(palette="Blues") + </a:t>
+            </a:r>
+          </a:p>
+          <a:p>
+            <a:pPr marL="0" indent="0">
+              <a:buNone/>
+            </a:pPr>
+            <a:r>
+              <a:rPr lang="en-AU" b="1" dirty="0"/>
+              <a:t>  </a:t>
+            </a:r>
+            <a:r>
+              <a:rPr lang="en-AU" b="1" dirty="0" err="1"/>
+              <a:t>scale_x_discrete</a:t>
+            </a:r>
+            <a:r>
+              <a:rPr lang="en-AU" b="1" dirty="0"/>
+              <a:t>(labels = c("Condition 1", "Condition 2", "Control"), name = "Condition") +</a:t>
+            </a:r>
+          </a:p>
+          <a:p>
+            <a:pPr marL="0" indent="0">
+              <a:buNone/>
+            </a:pPr>
+            <a:r>
+              <a:rPr lang="en-AU" b="1" dirty="0"/>
+              <a:t>  </a:t>
+            </a:r>
+            <a:r>
+              <a:rPr lang="en-AU" b="1" dirty="0" err="1"/>
+              <a:t>scale_y_continuous</a:t>
+            </a:r>
+            <a:r>
+              <a:rPr lang="en-AU" b="1" dirty="0"/>
+              <a:t>(name = "Reaction Time (</a:t>
+            </a:r>
+            <a:r>
+              <a:rPr lang="en-AU" b="1" dirty="0" err="1"/>
+              <a:t>ms</a:t>
+            </a:r>
+            <a:r>
+              <a:rPr lang="en-AU" b="1" dirty="0"/>
+              <a:t>)") +</a:t>
+            </a:r>
+          </a:p>
+          <a:p>
+            <a:pPr marL="0" indent="0">
+              <a:buNone/>
+            </a:pPr>
+            <a:r>
+              <a:rPr lang="en-AU" b="1" dirty="0"/>
+              <a:t>  </a:t>
+            </a:r>
+            <a:r>
+              <a:rPr lang="en-AU" b="1" dirty="0" err="1"/>
+              <a:t>theme_classic</a:t>
+            </a:r>
+            <a:r>
+              <a:rPr lang="en-AU" b="1" dirty="0"/>
+              <a:t>()+</a:t>
+            </a:r>
+          </a:p>
+          <a:p>
+            <a:pPr marL="0" indent="0">
+              <a:buNone/>
+            </a:pPr>
+            <a:r>
+              <a:rPr lang="en-AU" b="1" dirty="0"/>
+              <a:t>  theme(</a:t>
+            </a:r>
+            <a:r>
+              <a:rPr lang="en-AU" b="1" dirty="0" err="1"/>
+              <a:t>legend.position</a:t>
+            </a:r>
+            <a:r>
+              <a:rPr lang="en-AU" b="1" dirty="0"/>
+              <a:t> = "none")</a:t>
             </a:r>
           </a:p>
         </p:txBody>
@@ -8310,7 +9104,7 @@
     </p:spTree>
     <p:extLst>
       <p:ext uri="{BB962C8B-B14F-4D97-AF65-F5344CB8AC3E}">
-        <p14:creationId xmlns:p14="http://schemas.microsoft.com/office/powerpoint/2010/main" val="1953619556"/>
+        <p14:creationId xmlns:p14="http://schemas.microsoft.com/office/powerpoint/2010/main" val="2528711242"/>
       </p:ext>
     </p:extLst>
   </p:cSld>
@@ -8342,756 +9136,6 @@
           <p:cNvPr id="2" name="Title 1">
             <a:extLst>
               <a:ext uri="{FF2B5EF4-FFF2-40B4-BE49-F238E27FC236}">
-                <a16:creationId xmlns:a16="http://schemas.microsoft.com/office/drawing/2014/main" id="{A0E1D6D8-CF70-224A-9920-5DBE6D7EE635}"/>
-              </a:ext>
-            </a:extLst>
-          </p:cNvPr>
-          <p:cNvSpPr>
-            <a:spLocks noGrp="1"/>
-          </p:cNvSpPr>
-          <p:nvPr>
-            <p:ph type="title"/>
-          </p:nvPr>
-        </p:nvSpPr>
-        <p:spPr/>
-        <p:txBody>
-          <a:bodyPr/>
-          <a:lstStyle/>
-          <a:p>
-            <a:r>
-              <a:rPr lang="en-AU" dirty="0"/>
-              <a:t>Violin Plots with </a:t>
-            </a:r>
-            <a:r>
-              <a:rPr lang="en-AU" dirty="0" err="1"/>
-              <a:t>ggplot</a:t>
-            </a:r>
-            <a:r>
-              <a:rPr lang="en-AU" dirty="0"/>
-              <a:t>()</a:t>
-            </a:r>
-          </a:p>
-        </p:txBody>
-      </p:sp>
-      <p:sp>
-        <p:nvSpPr>
-          <p:cNvPr id="3" name="Content Placeholder 2">
-            <a:extLst>
-              <a:ext uri="{FF2B5EF4-FFF2-40B4-BE49-F238E27FC236}">
-                <a16:creationId xmlns:a16="http://schemas.microsoft.com/office/drawing/2014/main" id="{298BAAE6-6BC2-0A4F-940B-177AD67AC236}"/>
-              </a:ext>
-            </a:extLst>
-          </p:cNvPr>
-          <p:cNvSpPr>
-            <a:spLocks noGrp="1"/>
-          </p:cNvSpPr>
-          <p:nvPr>
-            <p:ph idx="1"/>
-          </p:nvPr>
-        </p:nvSpPr>
-        <p:spPr/>
-        <p:txBody>
-          <a:bodyPr/>
-          <a:lstStyle/>
-          <a:p>
-            <a:r>
-              <a:rPr lang="en-AU" dirty="0"/>
-              <a:t>Add a box plot and data points</a:t>
-            </a:r>
-          </a:p>
-          <a:p>
-            <a:endParaRPr lang="en-AU" dirty="0"/>
-          </a:p>
-          <a:p>
-            <a:pPr marL="0" indent="0">
-              <a:buNone/>
-            </a:pPr>
-            <a:r>
-              <a:rPr lang="en-AU" b="1" dirty="0" err="1">
-                <a:solidFill>
-                  <a:schemeClr val="tx1">
-                    <a:lumMod val="65000"/>
-                    <a:lumOff val="35000"/>
-                  </a:schemeClr>
-                </a:solidFill>
-              </a:rPr>
-              <a:t>ggplot</a:t>
-            </a:r>
-            <a:r>
-              <a:rPr lang="en-AU" b="1" dirty="0">
-                <a:solidFill>
-                  <a:schemeClr val="tx1">
-                    <a:lumMod val="65000"/>
-                    <a:lumOff val="35000"/>
-                  </a:schemeClr>
-                </a:solidFill>
-              </a:rPr>
-              <a:t>(data = </a:t>
-            </a:r>
-            <a:r>
-              <a:rPr lang="en-AU" b="1" dirty="0" err="1">
-                <a:solidFill>
-                  <a:schemeClr val="tx1">
-                    <a:lumMod val="65000"/>
-                    <a:lumOff val="35000"/>
-                  </a:schemeClr>
-                </a:solidFill>
-              </a:rPr>
-              <a:t>my_data</a:t>
-            </a:r>
-            <a:r>
-              <a:rPr lang="en-AU" b="1" dirty="0">
-                <a:solidFill>
-                  <a:schemeClr val="tx1">
-                    <a:lumMod val="65000"/>
-                    <a:lumOff val="35000"/>
-                  </a:schemeClr>
-                </a:solidFill>
-              </a:rPr>
-              <a:t>, </a:t>
-            </a:r>
-            <a:r>
-              <a:rPr lang="en-AU" b="1" dirty="0" err="1">
-                <a:solidFill>
-                  <a:schemeClr val="tx1">
-                    <a:lumMod val="65000"/>
-                    <a:lumOff val="35000"/>
-                  </a:schemeClr>
-                </a:solidFill>
-              </a:rPr>
-              <a:t>aes</a:t>
-            </a:r>
-            <a:r>
-              <a:rPr lang="en-AU" b="1" dirty="0">
-                <a:solidFill>
-                  <a:schemeClr val="tx1">
-                    <a:lumMod val="65000"/>
-                    <a:lumOff val="35000"/>
-                  </a:schemeClr>
-                </a:solidFill>
-              </a:rPr>
-              <a:t>(x = condition, y = RT)) +</a:t>
-            </a:r>
-          </a:p>
-          <a:p>
-            <a:pPr marL="0" indent="0">
-              <a:buNone/>
-            </a:pPr>
-            <a:r>
-              <a:rPr lang="en-AU" b="1" dirty="0">
-                <a:solidFill>
-                  <a:schemeClr val="tx1">
-                    <a:lumMod val="65000"/>
-                    <a:lumOff val="35000"/>
-                  </a:schemeClr>
-                </a:solidFill>
-              </a:rPr>
-              <a:t>  </a:t>
-            </a:r>
-            <a:r>
-              <a:rPr lang="en-AU" b="1" dirty="0" err="1">
-                <a:solidFill>
-                  <a:schemeClr val="tx1">
-                    <a:lumMod val="65000"/>
-                    <a:lumOff val="35000"/>
-                  </a:schemeClr>
-                </a:solidFill>
-              </a:rPr>
-              <a:t>geom_violin</a:t>
-            </a:r>
-            <a:r>
-              <a:rPr lang="en-AU" b="1" dirty="0">
-                <a:solidFill>
-                  <a:schemeClr val="tx1">
-                    <a:lumMod val="65000"/>
-                    <a:lumOff val="35000"/>
-                  </a:schemeClr>
-                </a:solidFill>
-              </a:rPr>
-              <a:t>(trim = FALSE) </a:t>
-            </a:r>
-            <a:r>
-              <a:rPr lang="en-AU" b="1" dirty="0"/>
-              <a:t>+</a:t>
-            </a:r>
-          </a:p>
-          <a:p>
-            <a:pPr marL="0" indent="0">
-              <a:buNone/>
-            </a:pPr>
-            <a:r>
-              <a:rPr lang="en-AU" b="1" dirty="0"/>
-              <a:t>  </a:t>
-            </a:r>
-            <a:r>
-              <a:rPr lang="en-AU" b="1" dirty="0" err="1"/>
-              <a:t>geom_boxplot</a:t>
-            </a:r>
-            <a:r>
-              <a:rPr lang="en-AU" b="1" dirty="0"/>
-              <a:t>(width = 0.1) +</a:t>
-            </a:r>
-          </a:p>
-          <a:p>
-            <a:pPr marL="0" indent="0">
-              <a:buNone/>
-            </a:pPr>
-            <a:r>
-              <a:rPr lang="en-AU" b="1" dirty="0"/>
-              <a:t>  </a:t>
-            </a:r>
-            <a:r>
-              <a:rPr lang="en-AU" b="1" dirty="0" err="1"/>
-              <a:t>geom_dotplot</a:t>
-            </a:r>
-            <a:r>
-              <a:rPr lang="en-AU" b="1" dirty="0"/>
-              <a:t>(</a:t>
-            </a:r>
-            <a:r>
-              <a:rPr lang="en-AU" b="1" dirty="0" err="1"/>
-              <a:t>binaxis</a:t>
-            </a:r>
-            <a:r>
-              <a:rPr lang="en-AU" b="1" dirty="0"/>
-              <a:t> = 'y', </a:t>
-            </a:r>
-            <a:r>
-              <a:rPr lang="en-AU" b="1" dirty="0" err="1"/>
-              <a:t>stackdir</a:t>
-            </a:r>
-            <a:r>
-              <a:rPr lang="en-AU" b="1" dirty="0"/>
-              <a:t> = '</a:t>
-            </a:r>
-            <a:r>
-              <a:rPr lang="en-AU" b="1" dirty="0" err="1"/>
-              <a:t>center</a:t>
-            </a:r>
-            <a:r>
-              <a:rPr lang="en-AU" b="1" dirty="0"/>
-              <a:t>', </a:t>
-            </a:r>
-            <a:r>
-              <a:rPr lang="en-AU" b="1" dirty="0" err="1"/>
-              <a:t>dotsize</a:t>
-            </a:r>
-            <a:r>
-              <a:rPr lang="en-AU" b="1" dirty="0"/>
-              <a:t> = .5)</a:t>
-            </a:r>
-          </a:p>
-        </p:txBody>
-      </p:sp>
-    </p:spTree>
-    <p:extLst>
-      <p:ext uri="{BB962C8B-B14F-4D97-AF65-F5344CB8AC3E}">
-        <p14:creationId xmlns:p14="http://schemas.microsoft.com/office/powerpoint/2010/main" val="3015158901"/>
-      </p:ext>
-    </p:extLst>
-  </p:cSld>
-  <p:clrMapOvr>
-    <a:masterClrMapping/>
-  </p:clrMapOvr>
-</p:sld>
-</file>
-
-<file path=ppt/slides/slide25.xml><?xml version="1.0" encoding="utf-8"?>
-<p:sld xmlns:a="http://schemas.openxmlformats.org/drawingml/2006/main" xmlns:r="http://schemas.openxmlformats.org/officeDocument/2006/relationships" xmlns:p="http://schemas.openxmlformats.org/presentationml/2006/main">
-  <p:cSld>
-    <p:spTree>
-      <p:nvGrpSpPr>
-        <p:cNvPr id="1" name=""/>
-        <p:cNvGrpSpPr/>
-        <p:nvPr/>
-      </p:nvGrpSpPr>
-      <p:grpSpPr>
-        <a:xfrm>
-          <a:off x="0" y="0"/>
-          <a:ext cx="0" cy="0"/>
-          <a:chOff x="0" y="0"/>
-          <a:chExt cx="0" cy="0"/>
-        </a:xfrm>
-      </p:grpSpPr>
-      <p:sp>
-        <p:nvSpPr>
-          <p:cNvPr id="2" name="Title 1">
-            <a:extLst>
-              <a:ext uri="{FF2B5EF4-FFF2-40B4-BE49-F238E27FC236}">
-                <a16:creationId xmlns:a16="http://schemas.microsoft.com/office/drawing/2014/main" id="{A0E1D6D8-CF70-224A-9920-5DBE6D7EE635}"/>
-              </a:ext>
-            </a:extLst>
-          </p:cNvPr>
-          <p:cNvSpPr>
-            <a:spLocks noGrp="1"/>
-          </p:cNvSpPr>
-          <p:nvPr>
-            <p:ph type="title"/>
-          </p:nvPr>
-        </p:nvSpPr>
-        <p:spPr/>
-        <p:txBody>
-          <a:bodyPr/>
-          <a:lstStyle/>
-          <a:p>
-            <a:r>
-              <a:rPr lang="en-AU" dirty="0"/>
-              <a:t>Violin Plots with </a:t>
-            </a:r>
-            <a:r>
-              <a:rPr lang="en-AU" dirty="0" err="1"/>
-              <a:t>ggplot</a:t>
-            </a:r>
-            <a:r>
-              <a:rPr lang="en-AU" dirty="0"/>
-              <a:t>()</a:t>
-            </a:r>
-          </a:p>
-        </p:txBody>
-      </p:sp>
-      <p:sp>
-        <p:nvSpPr>
-          <p:cNvPr id="3" name="Content Placeholder 2">
-            <a:extLst>
-              <a:ext uri="{FF2B5EF4-FFF2-40B4-BE49-F238E27FC236}">
-                <a16:creationId xmlns:a16="http://schemas.microsoft.com/office/drawing/2014/main" id="{298BAAE6-6BC2-0A4F-940B-177AD67AC236}"/>
-              </a:ext>
-            </a:extLst>
-          </p:cNvPr>
-          <p:cNvSpPr>
-            <a:spLocks noGrp="1"/>
-          </p:cNvSpPr>
-          <p:nvPr>
-            <p:ph idx="1"/>
-          </p:nvPr>
-        </p:nvSpPr>
-        <p:spPr>
-          <a:xfrm>
-            <a:off x="654628" y="1794452"/>
-            <a:ext cx="11208327" cy="4351338"/>
-          </a:xfrm>
-        </p:spPr>
-        <p:txBody>
-          <a:bodyPr>
-            <a:normAutofit fontScale="77500" lnSpcReduction="20000"/>
-          </a:bodyPr>
-          <a:lstStyle/>
-          <a:p>
-            <a:r>
-              <a:rPr lang="en-AU" dirty="0"/>
-              <a:t>Change colour by condition and edit labels</a:t>
-            </a:r>
-          </a:p>
-          <a:p>
-            <a:endParaRPr lang="en-AU" dirty="0"/>
-          </a:p>
-          <a:p>
-            <a:pPr marL="0" indent="0">
-              <a:buNone/>
-            </a:pPr>
-            <a:r>
-              <a:rPr lang="en-AU" b="1" dirty="0" err="1">
-                <a:solidFill>
-                  <a:schemeClr val="tx1">
-                    <a:lumMod val="65000"/>
-                    <a:lumOff val="35000"/>
-                  </a:schemeClr>
-                </a:solidFill>
-              </a:rPr>
-              <a:t>ggplot</a:t>
-            </a:r>
-            <a:r>
-              <a:rPr lang="en-AU" b="1" dirty="0">
-                <a:solidFill>
-                  <a:schemeClr val="tx1">
-                    <a:lumMod val="65000"/>
-                    <a:lumOff val="35000"/>
-                  </a:schemeClr>
-                </a:solidFill>
-              </a:rPr>
-              <a:t>(data = </a:t>
-            </a:r>
-            <a:r>
-              <a:rPr lang="en-AU" b="1" dirty="0" err="1">
-                <a:solidFill>
-                  <a:schemeClr val="tx1">
-                    <a:lumMod val="65000"/>
-                    <a:lumOff val="35000"/>
-                  </a:schemeClr>
-                </a:solidFill>
-              </a:rPr>
-              <a:t>my_data</a:t>
-            </a:r>
-            <a:r>
-              <a:rPr lang="en-AU" b="1" dirty="0">
-                <a:solidFill>
-                  <a:schemeClr val="tx1">
-                    <a:lumMod val="65000"/>
-                    <a:lumOff val="35000"/>
-                  </a:schemeClr>
-                </a:solidFill>
-              </a:rPr>
-              <a:t>, </a:t>
-            </a:r>
-            <a:r>
-              <a:rPr lang="en-AU" b="1" dirty="0" err="1">
-                <a:solidFill>
-                  <a:schemeClr val="tx1">
-                    <a:lumMod val="65000"/>
-                    <a:lumOff val="35000"/>
-                  </a:schemeClr>
-                </a:solidFill>
-              </a:rPr>
-              <a:t>aes</a:t>
-            </a:r>
-            <a:r>
-              <a:rPr lang="en-AU" b="1" dirty="0">
-                <a:solidFill>
-                  <a:schemeClr val="tx1">
-                    <a:lumMod val="65000"/>
-                    <a:lumOff val="35000"/>
-                  </a:schemeClr>
-                </a:solidFill>
-              </a:rPr>
-              <a:t>(x = condition, y = RT)) +</a:t>
-            </a:r>
-          </a:p>
-          <a:p>
-            <a:pPr marL="0" indent="0">
-              <a:buNone/>
-            </a:pPr>
-            <a:r>
-              <a:rPr lang="en-AU" b="1" dirty="0">
-                <a:solidFill>
-                  <a:schemeClr val="tx1">
-                    <a:lumMod val="65000"/>
-                    <a:lumOff val="35000"/>
-                  </a:schemeClr>
-                </a:solidFill>
-              </a:rPr>
-              <a:t>  </a:t>
-            </a:r>
-            <a:r>
-              <a:rPr lang="en-AU" b="1" dirty="0" err="1">
-                <a:solidFill>
-                  <a:schemeClr val="tx1">
-                    <a:lumMod val="65000"/>
-                    <a:lumOff val="35000"/>
-                  </a:schemeClr>
-                </a:solidFill>
-              </a:rPr>
-              <a:t>geom_violin</a:t>
-            </a:r>
-            <a:r>
-              <a:rPr lang="en-AU" b="1" dirty="0">
-                <a:solidFill>
-                  <a:schemeClr val="tx1">
-                    <a:lumMod val="65000"/>
-                    <a:lumOff val="35000"/>
-                  </a:schemeClr>
-                </a:solidFill>
-              </a:rPr>
-              <a:t>(trim = FALSE) +</a:t>
-            </a:r>
-          </a:p>
-          <a:p>
-            <a:pPr marL="0" indent="0">
-              <a:buNone/>
-            </a:pPr>
-            <a:r>
-              <a:rPr lang="en-AU" b="1" dirty="0">
-                <a:solidFill>
-                  <a:schemeClr val="tx1">
-                    <a:lumMod val="65000"/>
-                    <a:lumOff val="35000"/>
-                  </a:schemeClr>
-                </a:solidFill>
-              </a:rPr>
-              <a:t>  </a:t>
-            </a:r>
-            <a:r>
-              <a:rPr lang="en-AU" b="1" dirty="0" err="1">
-                <a:solidFill>
-                  <a:schemeClr val="tx1">
-                    <a:lumMod val="65000"/>
-                    <a:lumOff val="35000"/>
-                  </a:schemeClr>
-                </a:solidFill>
-              </a:rPr>
-              <a:t>geom_boxplot</a:t>
-            </a:r>
-            <a:r>
-              <a:rPr lang="en-AU" b="1" dirty="0">
-                <a:solidFill>
-                  <a:schemeClr val="tx1">
-                    <a:lumMod val="65000"/>
-                    <a:lumOff val="35000"/>
-                  </a:schemeClr>
-                </a:solidFill>
-              </a:rPr>
-              <a:t>(width = 0.1) +</a:t>
-            </a:r>
-          </a:p>
-          <a:p>
-            <a:pPr marL="0" indent="0">
-              <a:buNone/>
-            </a:pPr>
-            <a:r>
-              <a:rPr lang="en-AU" b="1" dirty="0">
-                <a:solidFill>
-                  <a:schemeClr val="tx1">
-                    <a:lumMod val="65000"/>
-                    <a:lumOff val="35000"/>
-                  </a:schemeClr>
-                </a:solidFill>
-              </a:rPr>
-              <a:t>  </a:t>
-            </a:r>
-            <a:r>
-              <a:rPr lang="en-AU" b="1" dirty="0" err="1">
-                <a:solidFill>
-                  <a:schemeClr val="tx1">
-                    <a:lumMod val="65000"/>
-                    <a:lumOff val="35000"/>
-                  </a:schemeClr>
-                </a:solidFill>
-              </a:rPr>
-              <a:t>geom_dotplot</a:t>
-            </a:r>
-            <a:r>
-              <a:rPr lang="en-AU" b="1" dirty="0">
-                <a:solidFill>
-                  <a:schemeClr val="tx1">
-                    <a:lumMod val="65000"/>
-                    <a:lumOff val="35000"/>
-                  </a:schemeClr>
-                </a:solidFill>
-              </a:rPr>
-              <a:t>(</a:t>
-            </a:r>
-            <a:r>
-              <a:rPr lang="en-AU" b="1" dirty="0" err="1">
-                <a:solidFill>
-                  <a:schemeClr val="tx1">
-                    <a:lumMod val="65000"/>
-                    <a:lumOff val="35000"/>
-                  </a:schemeClr>
-                </a:solidFill>
-              </a:rPr>
-              <a:t>binaxis</a:t>
-            </a:r>
-            <a:r>
-              <a:rPr lang="en-AU" b="1" dirty="0">
-                <a:solidFill>
-                  <a:schemeClr val="tx1">
-                    <a:lumMod val="65000"/>
-                    <a:lumOff val="35000"/>
-                  </a:schemeClr>
-                </a:solidFill>
-              </a:rPr>
-              <a:t> = 'y', </a:t>
-            </a:r>
-            <a:r>
-              <a:rPr lang="en-AU" b="1" dirty="0" err="1">
-                <a:solidFill>
-                  <a:schemeClr val="tx1">
-                    <a:lumMod val="65000"/>
-                    <a:lumOff val="35000"/>
-                  </a:schemeClr>
-                </a:solidFill>
-              </a:rPr>
-              <a:t>stackdir</a:t>
-            </a:r>
-            <a:r>
-              <a:rPr lang="en-AU" b="1" dirty="0">
-                <a:solidFill>
-                  <a:schemeClr val="tx1">
-                    <a:lumMod val="65000"/>
-                    <a:lumOff val="35000"/>
-                  </a:schemeClr>
-                </a:solidFill>
-              </a:rPr>
-              <a:t> = '</a:t>
-            </a:r>
-            <a:r>
-              <a:rPr lang="en-AU" b="1" dirty="0" err="1">
-                <a:solidFill>
-                  <a:schemeClr val="tx1">
-                    <a:lumMod val="65000"/>
-                    <a:lumOff val="35000"/>
-                  </a:schemeClr>
-                </a:solidFill>
-              </a:rPr>
-              <a:t>center</a:t>
-            </a:r>
-            <a:r>
-              <a:rPr lang="en-AU" b="1" dirty="0">
-                <a:solidFill>
-                  <a:schemeClr val="tx1">
-                    <a:lumMod val="65000"/>
-                    <a:lumOff val="35000"/>
-                  </a:schemeClr>
-                </a:solidFill>
-              </a:rPr>
-              <a:t>', </a:t>
-            </a:r>
-            <a:r>
-              <a:rPr lang="en-AU" b="1" dirty="0" err="1">
-                <a:solidFill>
-                  <a:schemeClr val="tx1">
-                    <a:lumMod val="65000"/>
-                    <a:lumOff val="35000"/>
-                  </a:schemeClr>
-                </a:solidFill>
-              </a:rPr>
-              <a:t>dotsize</a:t>
-            </a:r>
-            <a:r>
-              <a:rPr lang="en-AU" b="1" dirty="0">
-                <a:solidFill>
-                  <a:schemeClr val="tx1">
-                    <a:lumMod val="65000"/>
-                    <a:lumOff val="35000"/>
-                  </a:schemeClr>
-                </a:solidFill>
-              </a:rPr>
-              <a:t> = .5) </a:t>
-            </a:r>
-            <a:r>
-              <a:rPr lang="en-AU" b="1" dirty="0"/>
-              <a:t>+</a:t>
-            </a:r>
-          </a:p>
-          <a:p>
-            <a:pPr marL="0" indent="0">
-              <a:buNone/>
-            </a:pPr>
-            <a:r>
-              <a:rPr lang="en-AU" b="1" dirty="0"/>
-              <a:t>  </a:t>
-            </a:r>
-            <a:r>
-              <a:rPr lang="en-AU" b="1" dirty="0" err="1"/>
-              <a:t>scale_fill_brewer</a:t>
-            </a:r>
-            <a:r>
-              <a:rPr lang="en-AU" b="1" dirty="0"/>
-              <a:t>(palette="Blues") + </a:t>
-            </a:r>
-          </a:p>
-          <a:p>
-            <a:pPr marL="0" indent="0">
-              <a:buNone/>
-            </a:pPr>
-            <a:r>
-              <a:rPr lang="en-AU" b="1" dirty="0"/>
-              <a:t>  </a:t>
-            </a:r>
-            <a:r>
-              <a:rPr lang="en-AU" b="1" dirty="0" err="1"/>
-              <a:t>scale_x_discrete</a:t>
-            </a:r>
-            <a:r>
-              <a:rPr lang="en-AU" b="1" dirty="0"/>
-              <a:t>(labels = c("Condition 1", "Condition 2", "Control"), name = "Condition") +</a:t>
-            </a:r>
-          </a:p>
-          <a:p>
-            <a:pPr marL="0" indent="0">
-              <a:buNone/>
-            </a:pPr>
-            <a:r>
-              <a:rPr lang="en-AU" b="1" dirty="0"/>
-              <a:t>  </a:t>
-            </a:r>
-            <a:r>
-              <a:rPr lang="en-AU" b="1" dirty="0" err="1"/>
-              <a:t>scale_y_continuous</a:t>
-            </a:r>
-            <a:r>
-              <a:rPr lang="en-AU" b="1" dirty="0"/>
-              <a:t>(name = "Reaction Time (</a:t>
-            </a:r>
-            <a:r>
-              <a:rPr lang="en-AU" b="1" dirty="0" err="1"/>
-              <a:t>ms</a:t>
-            </a:r>
-            <a:r>
-              <a:rPr lang="en-AU" b="1" dirty="0"/>
-              <a:t>)") +</a:t>
-            </a:r>
-          </a:p>
-          <a:p>
-            <a:pPr marL="0" indent="0">
-              <a:buNone/>
-            </a:pPr>
-            <a:r>
-              <a:rPr lang="en-AU" b="1" dirty="0"/>
-              <a:t>  </a:t>
-            </a:r>
-            <a:r>
-              <a:rPr lang="en-AU" b="1" dirty="0" err="1"/>
-              <a:t>theme_classic</a:t>
-            </a:r>
-            <a:r>
-              <a:rPr lang="en-AU" b="1" dirty="0"/>
-              <a:t>()+</a:t>
-            </a:r>
-          </a:p>
-          <a:p>
-            <a:pPr marL="0" indent="0">
-              <a:buNone/>
-            </a:pPr>
-            <a:r>
-              <a:rPr lang="en-AU" b="1" dirty="0"/>
-              <a:t>  theme(</a:t>
-            </a:r>
-            <a:r>
-              <a:rPr lang="en-AU" b="1" dirty="0" err="1"/>
-              <a:t>legend.position</a:t>
-            </a:r>
-            <a:r>
-              <a:rPr lang="en-AU" b="1" dirty="0"/>
-              <a:t> = "none")</a:t>
-            </a:r>
-          </a:p>
-        </p:txBody>
-      </p:sp>
-    </p:spTree>
-    <p:extLst>
-      <p:ext uri="{BB962C8B-B14F-4D97-AF65-F5344CB8AC3E}">
-        <p14:creationId xmlns:p14="http://schemas.microsoft.com/office/powerpoint/2010/main" val="2528711242"/>
-      </p:ext>
-    </p:extLst>
-  </p:cSld>
-  <p:clrMapOvr>
-    <a:masterClrMapping/>
-  </p:clrMapOvr>
-</p:sld>
-</file>
-
-<file path=ppt/slides/slide26.xml><?xml version="1.0" encoding="utf-8"?>
-<p:sld xmlns:a="http://schemas.openxmlformats.org/drawingml/2006/main" xmlns:r="http://schemas.openxmlformats.org/officeDocument/2006/relationships" xmlns:p="http://schemas.openxmlformats.org/presentationml/2006/main">
-  <p:cSld>
-    <p:spTree>
-      <p:nvGrpSpPr>
-        <p:cNvPr id="1" name=""/>
-        <p:cNvGrpSpPr/>
-        <p:nvPr/>
-      </p:nvGrpSpPr>
-      <p:grpSpPr>
-        <a:xfrm>
-          <a:off x="0" y="0"/>
-          <a:ext cx="0" cy="0"/>
-          <a:chOff x="0" y="0"/>
-          <a:chExt cx="0" cy="0"/>
-        </a:xfrm>
-      </p:grpSpPr>
-      <p:sp>
-        <p:nvSpPr>
-          <p:cNvPr id="2" name="Title 1">
-            <a:extLst>
-              <a:ext uri="{FF2B5EF4-FFF2-40B4-BE49-F238E27FC236}">
                 <a16:creationId xmlns:a16="http://schemas.microsoft.com/office/drawing/2014/main" id="{842145A7-2E56-2348-BA9E-570991F6327F}"/>
               </a:ext>
             </a:extLst>
@@ -9156,15 +9200,7 @@
             </a:r>
             <a:r>
               <a:rPr lang="en-AU" b="1" dirty="0"/>
-              <a:t>library(</a:t>
-            </a:r>
-            <a:r>
-              <a:rPr lang="en-AU" b="1" dirty="0" err="1"/>
-              <a:t>pathwork</a:t>
-            </a:r>
-            <a:r>
-              <a:rPr lang="en-AU" b="1" dirty="0"/>
-              <a:t>) </a:t>
+              <a:t>library(patchwork) </a:t>
             </a:r>
             <a:r>
               <a:rPr lang="en-AU" dirty="0"/>
@@ -9307,7 +9343,7 @@
 </p:sld>
 </file>
 
-<file path=ppt/slides/slide27.xml><?xml version="1.0" encoding="utf-8"?>
+<file path=ppt/slides/slide25.xml><?xml version="1.0" encoding="utf-8"?>
 <p:sld xmlns:a="http://schemas.openxmlformats.org/drawingml/2006/main" xmlns:r="http://schemas.openxmlformats.org/officeDocument/2006/relationships" xmlns:p="http://schemas.openxmlformats.org/presentationml/2006/main">
   <p:cSld>
     <p:spTree>
@@ -9606,7 +9642,7 @@
 </p:sld>
 </file>
 
-<file path=ppt/slides/slide28.xml><?xml version="1.0" encoding="utf-8"?>
+<file path=ppt/slides/slide26.xml><?xml version="1.0" encoding="utf-8"?>
 <p:sld xmlns:a="http://schemas.openxmlformats.org/drawingml/2006/main" xmlns:r="http://schemas.openxmlformats.org/officeDocument/2006/relationships" xmlns:p="http://schemas.openxmlformats.org/presentationml/2006/main">
   <p:cSld>
     <p:spTree>
@@ -9732,7 +9768,7 @@
 </p:sld>
 </file>
 
-<file path=ppt/slides/slide29.xml><?xml version="1.0" encoding="utf-8"?>
+<file path=ppt/slides/slide27.xml><?xml version="1.0" encoding="utf-8"?>
 <p:sld xmlns:a="http://schemas.openxmlformats.org/drawingml/2006/main" xmlns:r="http://schemas.openxmlformats.org/officeDocument/2006/relationships" xmlns:p="http://schemas.openxmlformats.org/presentationml/2006/main">
   <p:cSld>
     <p:spTree>
@@ -10411,7 +10447,15 @@
           <a:p>
             <a:r>
               <a:rPr lang="en-AU" dirty="0"/>
-              <a:t>Can export to SVG to get loss-less quality plots</a:t>
+              <a:t>Can export to .</a:t>
+            </a:r>
+            <a:r>
+              <a:rPr lang="en-AU" dirty="0" err="1"/>
+              <a:t>svg</a:t>
+            </a:r>
+            <a:r>
+              <a:rPr lang="en-AU" dirty="0"/>
+              <a:t> to get loss-less quality plots</a:t>
             </a:r>
           </a:p>
           <a:p>
@@ -11019,4 +11063,299 @@
     </a:ext>
   </a:extLst>
 </a:theme>
+</file>
+
+<file path=ppt/theme/theme2.xml><?xml version="1.0" encoding="utf-8"?>
+<a:theme xmlns:a="http://schemas.openxmlformats.org/drawingml/2006/main" name="Office Theme">
+  <a:themeElements>
+    <a:clrScheme name="Office">
+      <a:dk1>
+        <a:sysClr val="windowText" lastClr="000000"/>
+      </a:dk1>
+      <a:lt1>
+        <a:sysClr val="window" lastClr="FFFFFF"/>
+      </a:lt1>
+      <a:dk2>
+        <a:srgbClr val="44546A"/>
+      </a:dk2>
+      <a:lt2>
+        <a:srgbClr val="E7E6E6"/>
+      </a:lt2>
+      <a:accent1>
+        <a:srgbClr val="4472C4"/>
+      </a:accent1>
+      <a:accent2>
+        <a:srgbClr val="ED7D31"/>
+      </a:accent2>
+      <a:accent3>
+        <a:srgbClr val="A5A5A5"/>
+      </a:accent3>
+      <a:accent4>
+        <a:srgbClr val="FFC000"/>
+      </a:accent4>
+      <a:accent5>
+        <a:srgbClr val="5B9BD5"/>
+      </a:accent5>
+      <a:accent6>
+        <a:srgbClr val="70AD47"/>
+      </a:accent6>
+      <a:hlink>
+        <a:srgbClr val="0563C1"/>
+      </a:hlink>
+      <a:folHlink>
+        <a:srgbClr val="954F72"/>
+      </a:folHlink>
+    </a:clrScheme>
+    <a:fontScheme name="Office">
+      <a:majorFont>
+        <a:latin typeface="Calibri Light" panose="020F0302020204030204"/>
+        <a:ea typeface=""/>
+        <a:cs typeface=""/>
+        <a:font script="Jpan" typeface="游ゴシック Light"/>
+        <a:font script="Hang" typeface="맑은 고딕"/>
+        <a:font script="Hans" typeface="等线 Light"/>
+        <a:font script="Hant" typeface="新細明體"/>
+        <a:font script="Arab" typeface="Times New Roman"/>
+        <a:font script="Hebr" typeface="Times New Roman"/>
+        <a:font script="Thai" typeface="Angsana New"/>
+        <a:font script="Ethi" typeface="Nyala"/>
+        <a:font script="Beng" typeface="Vrinda"/>
+        <a:font script="Gujr" typeface="Shruti"/>
+        <a:font script="Khmr" typeface="MoolBoran"/>
+        <a:font script="Knda" typeface="Tunga"/>
+        <a:font script="Guru" typeface="Raavi"/>
+        <a:font script="Cans" typeface="Euphemia"/>
+        <a:font script="Cher" typeface="Plantagenet Cherokee"/>
+        <a:font script="Yiii" typeface="Microsoft Yi Baiti"/>
+        <a:font script="Tibt" typeface="Microsoft Himalaya"/>
+        <a:font script="Thaa" typeface="MV Boli"/>
+        <a:font script="Deva" typeface="Mangal"/>
+        <a:font script="Telu" typeface="Gautami"/>
+        <a:font script="Taml" typeface="Latha"/>
+        <a:font script="Syrc" typeface="Estrangelo Edessa"/>
+        <a:font script="Orya" typeface="Kalinga"/>
+        <a:font script="Mlym" typeface="Kartika"/>
+        <a:font script="Laoo" typeface="DokChampa"/>
+        <a:font script="Sinh" typeface="Iskoola Pota"/>
+        <a:font script="Mong" typeface="Mongolian Baiti"/>
+        <a:font script="Viet" typeface="Times New Roman"/>
+        <a:font script="Uigh" typeface="Microsoft Uighur"/>
+        <a:font script="Geor" typeface="Sylfaen"/>
+        <a:font script="Armn" typeface="Arial"/>
+        <a:font script="Bugi" typeface="Leelawadee UI"/>
+        <a:font script="Bopo" typeface="Microsoft JhengHei"/>
+        <a:font script="Java" typeface="Javanese Text"/>
+        <a:font script="Lisu" typeface="Segoe UI"/>
+        <a:font script="Mymr" typeface="Myanmar Text"/>
+        <a:font script="Nkoo" typeface="Ebrima"/>
+        <a:font script="Olck" typeface="Nirmala UI"/>
+        <a:font script="Osma" typeface="Ebrima"/>
+        <a:font script="Phag" typeface="Phagspa"/>
+        <a:font script="Syrn" typeface="Estrangelo Edessa"/>
+        <a:font script="Syrj" typeface="Estrangelo Edessa"/>
+        <a:font script="Syre" typeface="Estrangelo Edessa"/>
+        <a:font script="Sora" typeface="Nirmala UI"/>
+        <a:font script="Tale" typeface="Microsoft Tai Le"/>
+        <a:font script="Talu" typeface="Microsoft New Tai Lue"/>
+        <a:font script="Tfng" typeface="Ebrima"/>
+      </a:majorFont>
+      <a:minorFont>
+        <a:latin typeface="Calibri" panose="020F0502020204030204"/>
+        <a:ea typeface=""/>
+        <a:cs typeface=""/>
+        <a:font script="Jpan" typeface="游ゴシック"/>
+        <a:font script="Hang" typeface="맑은 고딕"/>
+        <a:font script="Hans" typeface="等线"/>
+        <a:font script="Hant" typeface="新細明體"/>
+        <a:font script="Arab" typeface="Arial"/>
+        <a:font script="Hebr" typeface="Arial"/>
+        <a:font script="Thai" typeface="Cordia New"/>
+        <a:font script="Ethi" typeface="Nyala"/>
+        <a:font script="Beng" typeface="Vrinda"/>
+        <a:font script="Gujr" typeface="Shruti"/>
+        <a:font script="Khmr" typeface="DaunPenh"/>
+        <a:font script="Knda" typeface="Tunga"/>
+        <a:font script="Guru" typeface="Raavi"/>
+        <a:font script="Cans" typeface="Euphemia"/>
+        <a:font script="Cher" typeface="Plantagenet Cherokee"/>
+        <a:font script="Yiii" typeface="Microsoft Yi Baiti"/>
+        <a:font script="Tibt" typeface="Microsoft Himalaya"/>
+        <a:font script="Thaa" typeface="MV Boli"/>
+        <a:font script="Deva" typeface="Mangal"/>
+        <a:font script="Telu" typeface="Gautami"/>
+        <a:font script="Taml" typeface="Latha"/>
+        <a:font script="Syrc" typeface="Estrangelo Edessa"/>
+        <a:font script="Orya" typeface="Kalinga"/>
+        <a:font script="Mlym" typeface="Kartika"/>
+        <a:font script="Laoo" typeface="DokChampa"/>
+        <a:font script="Sinh" typeface="Iskoola Pota"/>
+        <a:font script="Mong" typeface="Mongolian Baiti"/>
+        <a:font script="Viet" typeface="Arial"/>
+        <a:font script="Uigh" typeface="Microsoft Uighur"/>
+        <a:font script="Geor" typeface="Sylfaen"/>
+        <a:font script="Armn" typeface="Arial"/>
+        <a:font script="Bugi" typeface="Leelawadee UI"/>
+        <a:font script="Bopo" typeface="Microsoft JhengHei"/>
+        <a:font script="Java" typeface="Javanese Text"/>
+        <a:font script="Lisu" typeface="Segoe UI"/>
+        <a:font script="Mymr" typeface="Myanmar Text"/>
+        <a:font script="Nkoo" typeface="Ebrima"/>
+        <a:font script="Olck" typeface="Nirmala UI"/>
+        <a:font script="Osma" typeface="Ebrima"/>
+        <a:font script="Phag" typeface="Phagspa"/>
+        <a:font script="Syrn" typeface="Estrangelo Edessa"/>
+        <a:font script="Syrj" typeface="Estrangelo Edessa"/>
+        <a:font script="Syre" typeface="Estrangelo Edessa"/>
+        <a:font script="Sora" typeface="Nirmala UI"/>
+        <a:font script="Tale" typeface="Microsoft Tai Le"/>
+        <a:font script="Talu" typeface="Microsoft New Tai Lue"/>
+        <a:font script="Tfng" typeface="Ebrima"/>
+      </a:minorFont>
+    </a:fontScheme>
+    <a:fmtScheme name="Office">
+      <a:fillStyleLst>
+        <a:solidFill>
+          <a:schemeClr val="phClr"/>
+        </a:solidFill>
+        <a:gradFill rotWithShape="1">
+          <a:gsLst>
+            <a:gs pos="0">
+              <a:schemeClr val="phClr">
+                <a:lumMod val="110000"/>
+                <a:satMod val="105000"/>
+                <a:tint val="67000"/>
+              </a:schemeClr>
+            </a:gs>
+            <a:gs pos="50000">
+              <a:schemeClr val="phClr">
+                <a:lumMod val="105000"/>
+                <a:satMod val="103000"/>
+                <a:tint val="73000"/>
+              </a:schemeClr>
+            </a:gs>
+            <a:gs pos="100000">
+              <a:schemeClr val="phClr">
+                <a:lumMod val="105000"/>
+                <a:satMod val="109000"/>
+                <a:tint val="81000"/>
+              </a:schemeClr>
+            </a:gs>
+          </a:gsLst>
+          <a:lin ang="5400000" scaled="0"/>
+        </a:gradFill>
+        <a:gradFill rotWithShape="1">
+          <a:gsLst>
+            <a:gs pos="0">
+              <a:schemeClr val="phClr">
+                <a:satMod val="103000"/>
+                <a:lumMod val="102000"/>
+                <a:tint val="94000"/>
+              </a:schemeClr>
+            </a:gs>
+            <a:gs pos="50000">
+              <a:schemeClr val="phClr">
+                <a:satMod val="110000"/>
+                <a:lumMod val="100000"/>
+                <a:shade val="100000"/>
+              </a:schemeClr>
+            </a:gs>
+            <a:gs pos="100000">
+              <a:schemeClr val="phClr">
+                <a:lumMod val="99000"/>
+                <a:satMod val="120000"/>
+                <a:shade val="78000"/>
+              </a:schemeClr>
+            </a:gs>
+          </a:gsLst>
+          <a:lin ang="5400000" scaled="0"/>
+        </a:gradFill>
+      </a:fillStyleLst>
+      <a:lnStyleLst>
+        <a:ln w="6350" cap="flat" cmpd="sng" algn="ctr">
+          <a:solidFill>
+            <a:schemeClr val="phClr"/>
+          </a:solidFill>
+          <a:prstDash val="solid"/>
+          <a:miter lim="800000"/>
+        </a:ln>
+        <a:ln w="12700" cap="flat" cmpd="sng" algn="ctr">
+          <a:solidFill>
+            <a:schemeClr val="phClr"/>
+          </a:solidFill>
+          <a:prstDash val="solid"/>
+          <a:miter lim="800000"/>
+        </a:ln>
+        <a:ln w="19050" cap="flat" cmpd="sng" algn="ctr">
+          <a:solidFill>
+            <a:schemeClr val="phClr"/>
+          </a:solidFill>
+          <a:prstDash val="solid"/>
+          <a:miter lim="800000"/>
+        </a:ln>
+      </a:lnStyleLst>
+      <a:effectStyleLst>
+        <a:effectStyle>
+          <a:effectLst/>
+        </a:effectStyle>
+        <a:effectStyle>
+          <a:effectLst/>
+        </a:effectStyle>
+        <a:effectStyle>
+          <a:effectLst>
+            <a:outerShdw blurRad="57150" dist="19050" dir="5400000" algn="ctr" rotWithShape="0">
+              <a:srgbClr val="000000">
+                <a:alpha val="63000"/>
+              </a:srgbClr>
+            </a:outerShdw>
+          </a:effectLst>
+        </a:effectStyle>
+      </a:effectStyleLst>
+      <a:bgFillStyleLst>
+        <a:solidFill>
+          <a:schemeClr val="phClr"/>
+        </a:solidFill>
+        <a:solidFill>
+          <a:schemeClr val="phClr">
+            <a:tint val="95000"/>
+            <a:satMod val="170000"/>
+          </a:schemeClr>
+        </a:solidFill>
+        <a:gradFill rotWithShape="1">
+          <a:gsLst>
+            <a:gs pos="0">
+              <a:schemeClr val="phClr">
+                <a:tint val="93000"/>
+                <a:satMod val="150000"/>
+                <a:shade val="98000"/>
+                <a:lumMod val="102000"/>
+              </a:schemeClr>
+            </a:gs>
+            <a:gs pos="50000">
+              <a:schemeClr val="phClr">
+                <a:tint val="98000"/>
+                <a:satMod val="130000"/>
+                <a:shade val="90000"/>
+                <a:lumMod val="103000"/>
+              </a:schemeClr>
+            </a:gs>
+            <a:gs pos="100000">
+              <a:schemeClr val="phClr">
+                <a:shade val="63000"/>
+                <a:satMod val="120000"/>
+              </a:schemeClr>
+            </a:gs>
+          </a:gsLst>
+          <a:lin ang="5400000" scaled="0"/>
+        </a:gradFill>
+      </a:bgFillStyleLst>
+    </a:fmtScheme>
+  </a:themeElements>
+  <a:objectDefaults/>
+  <a:extraClrSchemeLst/>
+  <a:extLst>
+    <a:ext uri="{05A4C25C-085E-4340-85A3-A5531E510DB2}">
+      <thm15:themeFamily xmlns:thm15="http://schemas.microsoft.com/office/thememl/2012/main" name="Office Theme" id="{62F939B6-93AF-4DB8-9C6B-D6C7DFDC589F}" vid="{4A3C46E8-61CC-4603-A589-7422A47A8E4A}"/>
+    </a:ext>
+  </a:extLst>
+</a:theme>
 </file>
</xml_diff>